<commit_message>
Modifs na introdução, referencias, e diagramas.
</commit_message>
<xml_diff>
--- a/relatorio/abntex2-modelos-1.9.2/figuras/diagramas.pptx
+++ b/relatorio/abntex2-modelos-1.9.2/figuras/diagramas.pptx
@@ -7,6 +7,7 @@
   <p:sldIdLst>
     <p:sldId id="256" r:id="rId2"/>
     <p:sldId id="257" r:id="rId3"/>
+    <p:sldId id="258" r:id="rId4"/>
   </p:sldIdLst>
   <p:sldSz cx="12192000" cy="6858000"/>
   <p:notesSz cx="6858000" cy="9144000"/>
@@ -105,6 +106,11 @@
       </a:defRPr>
     </a:lvl9pPr>
   </p:defaultTextStyle>
+  <p:extLst>
+    <p:ext uri="{EFAFB233-063F-42B5-8137-9DF3F51BA10A}">
+      <p15:sldGuideLst xmlns:p15="http://schemas.microsoft.com/office/powerpoint/2012/main"/>
+    </p:ext>
+  </p:extLst>
 </p:presentation>
 </file>
 
@@ -239,7 +245,7 @@
           <a:p>
             <a:fld id="{7F981E3C-F023-4B2E-8C30-C087B244E656}" type="datetimeFigureOut">
               <a:rPr lang="pt-BR" smtClean="0"/>
-              <a:t>27/04/2014</a:t>
+              <a:t>10/05/2014</a:t>
             </a:fld>
             <a:endParaRPr lang="pt-BR"/>
           </a:p>
@@ -409,7 +415,7 @@
           <a:p>
             <a:fld id="{7F981E3C-F023-4B2E-8C30-C087B244E656}" type="datetimeFigureOut">
               <a:rPr lang="pt-BR" smtClean="0"/>
-              <a:t>27/04/2014</a:t>
+              <a:t>10/05/2014</a:t>
             </a:fld>
             <a:endParaRPr lang="pt-BR"/>
           </a:p>
@@ -589,7 +595,7 @@
           <a:p>
             <a:fld id="{7F981E3C-F023-4B2E-8C30-C087B244E656}" type="datetimeFigureOut">
               <a:rPr lang="pt-BR" smtClean="0"/>
-              <a:t>27/04/2014</a:t>
+              <a:t>10/05/2014</a:t>
             </a:fld>
             <a:endParaRPr lang="pt-BR"/>
           </a:p>
@@ -759,7 +765,7 @@
           <a:p>
             <a:fld id="{7F981E3C-F023-4B2E-8C30-C087B244E656}" type="datetimeFigureOut">
               <a:rPr lang="pt-BR" smtClean="0"/>
-              <a:t>27/04/2014</a:t>
+              <a:t>10/05/2014</a:t>
             </a:fld>
             <a:endParaRPr lang="pt-BR"/>
           </a:p>
@@ -1005,7 +1011,7 @@
           <a:p>
             <a:fld id="{7F981E3C-F023-4B2E-8C30-C087B244E656}" type="datetimeFigureOut">
               <a:rPr lang="pt-BR" smtClean="0"/>
-              <a:t>27/04/2014</a:t>
+              <a:t>10/05/2014</a:t>
             </a:fld>
             <a:endParaRPr lang="pt-BR"/>
           </a:p>
@@ -1237,7 +1243,7 @@
           <a:p>
             <a:fld id="{7F981E3C-F023-4B2E-8C30-C087B244E656}" type="datetimeFigureOut">
               <a:rPr lang="pt-BR" smtClean="0"/>
-              <a:t>27/04/2014</a:t>
+              <a:t>10/05/2014</a:t>
             </a:fld>
             <a:endParaRPr lang="pt-BR"/>
           </a:p>
@@ -1604,7 +1610,7 @@
           <a:p>
             <a:fld id="{7F981E3C-F023-4B2E-8C30-C087B244E656}" type="datetimeFigureOut">
               <a:rPr lang="pt-BR" smtClean="0"/>
-              <a:t>27/04/2014</a:t>
+              <a:t>10/05/2014</a:t>
             </a:fld>
             <a:endParaRPr lang="pt-BR"/>
           </a:p>
@@ -1722,7 +1728,7 @@
           <a:p>
             <a:fld id="{7F981E3C-F023-4B2E-8C30-C087B244E656}" type="datetimeFigureOut">
               <a:rPr lang="pt-BR" smtClean="0"/>
-              <a:t>27/04/2014</a:t>
+              <a:t>10/05/2014</a:t>
             </a:fld>
             <a:endParaRPr lang="pt-BR"/>
           </a:p>
@@ -1817,7 +1823,7 @@
           <a:p>
             <a:fld id="{7F981E3C-F023-4B2E-8C30-C087B244E656}" type="datetimeFigureOut">
               <a:rPr lang="pt-BR" smtClean="0"/>
-              <a:t>27/04/2014</a:t>
+              <a:t>10/05/2014</a:t>
             </a:fld>
             <a:endParaRPr lang="pt-BR"/>
           </a:p>
@@ -2094,7 +2100,7 @@
           <a:p>
             <a:fld id="{7F981E3C-F023-4B2E-8C30-C087B244E656}" type="datetimeFigureOut">
               <a:rPr lang="pt-BR" smtClean="0"/>
-              <a:t>27/04/2014</a:t>
+              <a:t>10/05/2014</a:t>
             </a:fld>
             <a:endParaRPr lang="pt-BR"/>
           </a:p>
@@ -2347,7 +2353,7 @@
           <a:p>
             <a:fld id="{7F981E3C-F023-4B2E-8C30-C087B244E656}" type="datetimeFigureOut">
               <a:rPr lang="pt-BR" smtClean="0"/>
-              <a:t>27/04/2014</a:t>
+              <a:t>10/05/2014</a:t>
             </a:fld>
             <a:endParaRPr lang="pt-BR"/>
           </a:p>
@@ -2560,7 +2566,7 @@
           <a:p>
             <a:fld id="{7F981E3C-F023-4B2E-8C30-C087B244E656}" type="datetimeFigureOut">
               <a:rPr lang="pt-BR" smtClean="0"/>
-              <a:t>27/04/2014</a:t>
+              <a:t>10/05/2014</a:t>
             </a:fld>
             <a:endParaRPr lang="pt-BR"/>
           </a:p>
@@ -4858,6 +4864,1133 @@
 </p:sld>
 </file>
 
+<file path=ppt/slides/slide3.xml><?xml version="1.0" encoding="utf-8"?>
+<p:sld xmlns:a="http://schemas.openxmlformats.org/drawingml/2006/main" xmlns:r="http://schemas.openxmlformats.org/officeDocument/2006/relationships" xmlns:p="http://schemas.openxmlformats.org/presentationml/2006/main">
+  <p:cSld>
+    <p:spTree>
+      <p:nvGrpSpPr>
+        <p:cNvPr id="1" name=""/>
+        <p:cNvGrpSpPr/>
+        <p:nvPr/>
+      </p:nvGrpSpPr>
+      <p:grpSpPr>
+        <a:xfrm>
+          <a:off x="0" y="0"/>
+          <a:ext cx="0" cy="0"/>
+          <a:chOff x="0" y="0"/>
+          <a:chExt cx="0" cy="0"/>
+        </a:xfrm>
+      </p:grpSpPr>
+      <p:sp>
+        <p:nvSpPr>
+          <p:cNvPr id="4" name="Retângulo de cantos arredondados 3"/>
+          <p:cNvSpPr/>
+          <p:nvPr/>
+        </p:nvSpPr>
+        <p:spPr>
+          <a:xfrm>
+            <a:off x="570607" y="169751"/>
+            <a:ext cx="627937" cy="577127"/>
+          </a:xfrm>
+          <a:prstGeom prst="roundRect">
+            <a:avLst/>
+          </a:prstGeom>
+          <a:solidFill>
+            <a:schemeClr val="accent6">
+              <a:lumMod val="40000"/>
+              <a:lumOff val="60000"/>
+            </a:schemeClr>
+          </a:solidFill>
+        </p:spPr>
+        <p:style>
+          <a:lnRef idx="2">
+            <a:schemeClr val="accent4">
+              <a:shade val="50000"/>
+            </a:schemeClr>
+          </a:lnRef>
+          <a:fillRef idx="1">
+            <a:schemeClr val="accent4"/>
+          </a:fillRef>
+          <a:effectRef idx="0">
+            <a:schemeClr val="accent4"/>
+          </a:effectRef>
+          <a:fontRef idx="minor">
+            <a:schemeClr val="lt1"/>
+          </a:fontRef>
+        </p:style>
+        <p:txBody>
+          <a:bodyPr rtlCol="0" anchor="ctr"/>
+          <a:lstStyle/>
+          <a:p>
+            <a:pPr algn="ctr"/>
+            <a:endParaRPr lang="pt-BR" dirty="0"/>
+          </a:p>
+        </p:txBody>
+      </p:sp>
+      <p:sp>
+        <p:nvSpPr>
+          <p:cNvPr id="5" name="Retângulo de cantos arredondados 4"/>
+          <p:cNvSpPr/>
+          <p:nvPr/>
+        </p:nvSpPr>
+        <p:spPr>
+          <a:xfrm>
+            <a:off x="678736" y="314638"/>
+            <a:ext cx="627937" cy="577127"/>
+          </a:xfrm>
+          <a:prstGeom prst="roundRect">
+            <a:avLst/>
+          </a:prstGeom>
+          <a:solidFill>
+            <a:schemeClr val="accent2">
+              <a:lumMod val="40000"/>
+              <a:lumOff val="60000"/>
+            </a:schemeClr>
+          </a:solidFill>
+        </p:spPr>
+        <p:style>
+          <a:lnRef idx="2">
+            <a:schemeClr val="accent4">
+              <a:shade val="50000"/>
+            </a:schemeClr>
+          </a:lnRef>
+          <a:fillRef idx="1">
+            <a:schemeClr val="accent4"/>
+          </a:fillRef>
+          <a:effectRef idx="0">
+            <a:schemeClr val="accent4"/>
+          </a:effectRef>
+          <a:fontRef idx="minor">
+            <a:schemeClr val="lt1"/>
+          </a:fontRef>
+        </p:style>
+        <p:txBody>
+          <a:bodyPr rtlCol="0" anchor="ctr"/>
+          <a:lstStyle/>
+          <a:p>
+            <a:pPr algn="ctr"/>
+            <a:endParaRPr lang="pt-BR" dirty="0"/>
+          </a:p>
+        </p:txBody>
+      </p:sp>
+      <p:sp>
+        <p:nvSpPr>
+          <p:cNvPr id="6" name="Retângulo de cantos arredondados 5"/>
+          <p:cNvSpPr/>
+          <p:nvPr/>
+        </p:nvSpPr>
+        <p:spPr>
+          <a:xfrm>
+            <a:off x="786865" y="459525"/>
+            <a:ext cx="627937" cy="577127"/>
+          </a:xfrm>
+          <a:prstGeom prst="roundRect">
+            <a:avLst/>
+          </a:prstGeom>
+          <a:solidFill>
+            <a:schemeClr val="accent1">
+              <a:lumMod val="40000"/>
+              <a:lumOff val="60000"/>
+            </a:schemeClr>
+          </a:solidFill>
+        </p:spPr>
+        <p:style>
+          <a:lnRef idx="2">
+            <a:schemeClr val="accent4">
+              <a:shade val="50000"/>
+            </a:schemeClr>
+          </a:lnRef>
+          <a:fillRef idx="1">
+            <a:schemeClr val="accent4"/>
+          </a:fillRef>
+          <a:effectRef idx="0">
+            <a:schemeClr val="accent4"/>
+          </a:effectRef>
+          <a:fontRef idx="minor">
+            <a:schemeClr val="lt1"/>
+          </a:fontRef>
+        </p:style>
+        <p:txBody>
+          <a:bodyPr rtlCol="0" anchor="ctr"/>
+          <a:lstStyle/>
+          <a:p>
+            <a:pPr algn="ctr"/>
+            <a:endParaRPr lang="pt-BR" dirty="0"/>
+          </a:p>
+        </p:txBody>
+      </p:sp>
+      <p:sp>
+        <p:nvSpPr>
+          <p:cNvPr id="7" name="Retângulo de cantos arredondados 6"/>
+          <p:cNvSpPr/>
+          <p:nvPr/>
+        </p:nvSpPr>
+        <p:spPr>
+          <a:xfrm>
+            <a:off x="2743380" y="459525"/>
+            <a:ext cx="1790163" cy="577127"/>
+          </a:xfrm>
+          <a:prstGeom prst="roundRect">
+            <a:avLst/>
+          </a:prstGeom>
+        </p:spPr>
+        <p:style>
+          <a:lnRef idx="2">
+            <a:schemeClr val="accent6">
+              <a:shade val="50000"/>
+            </a:schemeClr>
+          </a:lnRef>
+          <a:fillRef idx="1">
+            <a:schemeClr val="accent6"/>
+          </a:fillRef>
+          <a:effectRef idx="0">
+            <a:schemeClr val="accent6"/>
+          </a:effectRef>
+          <a:fontRef idx="minor">
+            <a:schemeClr val="lt1"/>
+          </a:fontRef>
+        </p:style>
+        <p:txBody>
+          <a:bodyPr rtlCol="0" anchor="ctr"/>
+          <a:lstStyle/>
+          <a:p>
+            <a:pPr algn="ctr"/>
+            <a:r>
+              <a:rPr lang="pt-PT" dirty="0" smtClean="0"/>
+              <a:t>Video Encoder</a:t>
+            </a:r>
+          </a:p>
+        </p:txBody>
+      </p:sp>
+      <p:sp>
+        <p:nvSpPr>
+          <p:cNvPr id="8" name="Retângulo de cantos arredondados 7"/>
+          <p:cNvSpPr/>
+          <p:nvPr/>
+        </p:nvSpPr>
+        <p:spPr>
+          <a:xfrm>
+            <a:off x="6553022" y="1455503"/>
+            <a:ext cx="1790163" cy="577127"/>
+          </a:xfrm>
+          <a:prstGeom prst="roundRect">
+            <a:avLst/>
+          </a:prstGeom>
+        </p:spPr>
+        <p:style>
+          <a:lnRef idx="2">
+            <a:schemeClr val="accent6">
+              <a:shade val="50000"/>
+            </a:schemeClr>
+          </a:lnRef>
+          <a:fillRef idx="1">
+            <a:schemeClr val="accent6"/>
+          </a:fillRef>
+          <a:effectRef idx="0">
+            <a:schemeClr val="accent6"/>
+          </a:effectRef>
+          <a:fontRef idx="minor">
+            <a:schemeClr val="lt1"/>
+          </a:fontRef>
+        </p:style>
+        <p:txBody>
+          <a:bodyPr rtlCol="0" anchor="ctr"/>
+          <a:lstStyle/>
+          <a:p>
+            <a:pPr algn="ctr"/>
+            <a:r>
+              <a:rPr lang="pt-PT" dirty="0" smtClean="0"/>
+              <a:t>MPEG2 Muxer</a:t>
+            </a:r>
+          </a:p>
+        </p:txBody>
+      </p:sp>
+      <p:cxnSp>
+        <p:nvCxnSpPr>
+          <p:cNvPr id="9" name="Conector de seta reta 8"/>
+          <p:cNvCxnSpPr>
+            <a:stCxn id="6" idx="3"/>
+            <a:endCxn id="7" idx="1"/>
+          </p:cNvCxnSpPr>
+          <p:nvPr/>
+        </p:nvCxnSpPr>
+        <p:spPr>
+          <a:xfrm>
+            <a:off x="1414802" y="748089"/>
+            <a:ext cx="1328578" cy="0"/>
+          </a:xfrm>
+          <a:prstGeom prst="straightConnector1">
+            <a:avLst/>
+          </a:prstGeom>
+          <a:ln>
+            <a:tailEnd type="triangle"/>
+          </a:ln>
+        </p:spPr>
+        <p:style>
+          <a:lnRef idx="1">
+            <a:schemeClr val="accent1"/>
+          </a:lnRef>
+          <a:fillRef idx="0">
+            <a:schemeClr val="accent1"/>
+          </a:fillRef>
+          <a:effectRef idx="0">
+            <a:schemeClr val="accent1"/>
+          </a:effectRef>
+          <a:fontRef idx="minor">
+            <a:schemeClr val="tx1"/>
+          </a:fontRef>
+        </p:style>
+      </p:cxnSp>
+      <p:grpSp>
+        <p:nvGrpSpPr>
+          <p:cNvPr id="15" name="Grupo 14"/>
+          <p:cNvGrpSpPr/>
+          <p:nvPr/>
+        </p:nvGrpSpPr>
+        <p:grpSpPr>
+          <a:xfrm rot="10800000">
+            <a:off x="10029950" y="2075035"/>
+            <a:ext cx="768456" cy="1113827"/>
+            <a:chOff x="2492375" y="2743199"/>
+            <a:chExt cx="1082802" cy="1569450"/>
+          </a:xfrm>
+        </p:grpSpPr>
+        <p:sp>
+          <p:nvSpPr>
+            <p:cNvPr id="16" name="Triângulo isósceles 15"/>
+            <p:cNvSpPr/>
+            <p:nvPr/>
+          </p:nvSpPr>
+          <p:spPr>
+            <a:xfrm>
+              <a:off x="2492375" y="3379199"/>
+              <a:ext cx="1082802" cy="933450"/>
+            </a:xfrm>
+            <a:prstGeom prst="triangle">
+              <a:avLst/>
+            </a:prstGeom>
+            <a:ln>
+              <a:solidFill>
+                <a:schemeClr val="tx1"/>
+              </a:solidFill>
+            </a:ln>
+          </p:spPr>
+          <p:style>
+            <a:lnRef idx="2">
+              <a:schemeClr val="accent6"/>
+            </a:lnRef>
+            <a:fillRef idx="1">
+              <a:schemeClr val="lt1"/>
+            </a:fillRef>
+            <a:effectRef idx="0">
+              <a:schemeClr val="accent6"/>
+            </a:effectRef>
+            <a:fontRef idx="minor">
+              <a:schemeClr val="dk1"/>
+            </a:fontRef>
+          </p:style>
+          <p:txBody>
+            <a:bodyPr rtlCol="0" anchor="ctr"/>
+            <a:lstStyle/>
+            <a:p>
+              <a:pPr algn="ctr"/>
+              <a:endParaRPr lang="pt-BR"/>
+            </a:p>
+          </p:txBody>
+        </p:sp>
+        <p:cxnSp>
+          <p:nvCxnSpPr>
+            <p:cNvPr id="17" name="Conector reto 16"/>
+            <p:cNvCxnSpPr>
+              <a:stCxn id="16" idx="3"/>
+            </p:cNvCxnSpPr>
+            <p:nvPr/>
+          </p:nvCxnSpPr>
+          <p:spPr>
+            <a:xfrm flipV="1">
+              <a:off x="3033776" y="2743199"/>
+              <a:ext cx="0" cy="1569450"/>
+            </a:xfrm>
+            <a:prstGeom prst="line">
+              <a:avLst/>
+            </a:prstGeom>
+            <a:ln w="12700"/>
+          </p:spPr>
+          <p:style>
+            <a:lnRef idx="1">
+              <a:schemeClr val="dk1"/>
+            </a:lnRef>
+            <a:fillRef idx="0">
+              <a:schemeClr val="dk1"/>
+            </a:fillRef>
+            <a:effectRef idx="0">
+              <a:schemeClr val="dk1"/>
+            </a:effectRef>
+            <a:fontRef idx="minor">
+              <a:schemeClr val="tx1"/>
+            </a:fontRef>
+          </p:style>
+        </p:cxnSp>
+      </p:grpSp>
+      <p:sp>
+        <p:nvSpPr>
+          <p:cNvPr id="21" name="Retângulo de cantos arredondados 20"/>
+          <p:cNvSpPr/>
+          <p:nvPr/>
+        </p:nvSpPr>
+        <p:spPr>
+          <a:xfrm>
+            <a:off x="2717980" y="1466816"/>
+            <a:ext cx="1790163" cy="524092"/>
+          </a:xfrm>
+          <a:prstGeom prst="roundRect">
+            <a:avLst/>
+          </a:prstGeom>
+        </p:spPr>
+        <p:style>
+          <a:lnRef idx="2">
+            <a:schemeClr val="accent6">
+              <a:shade val="50000"/>
+            </a:schemeClr>
+          </a:lnRef>
+          <a:fillRef idx="1">
+            <a:schemeClr val="accent6"/>
+          </a:fillRef>
+          <a:effectRef idx="0">
+            <a:schemeClr val="accent6"/>
+          </a:effectRef>
+          <a:fontRef idx="minor">
+            <a:schemeClr val="lt1"/>
+          </a:fontRef>
+        </p:style>
+        <p:txBody>
+          <a:bodyPr rtlCol="0" anchor="ctr"/>
+          <a:lstStyle/>
+          <a:p>
+            <a:pPr algn="ctr"/>
+            <a:r>
+              <a:rPr lang="pt-PT" dirty="0" smtClean="0"/>
+              <a:t>Audio Encoder</a:t>
+            </a:r>
+            <a:endParaRPr lang="pt-PT" dirty="0" smtClean="0"/>
+          </a:p>
+        </p:txBody>
+      </p:sp>
+      <p:cxnSp>
+        <p:nvCxnSpPr>
+          <p:cNvPr id="22" name="Conector de seta reta 21"/>
+          <p:cNvCxnSpPr>
+            <a:endCxn id="21" idx="1"/>
+          </p:cNvCxnSpPr>
+          <p:nvPr/>
+        </p:nvCxnSpPr>
+        <p:spPr>
+          <a:xfrm>
+            <a:off x="1636693" y="1728862"/>
+            <a:ext cx="1081287" cy="0"/>
+          </a:xfrm>
+          <a:prstGeom prst="straightConnector1">
+            <a:avLst/>
+          </a:prstGeom>
+          <a:ln>
+            <a:tailEnd type="triangle"/>
+          </a:ln>
+        </p:spPr>
+        <p:style>
+          <a:lnRef idx="1">
+            <a:schemeClr val="accent1"/>
+          </a:lnRef>
+          <a:fillRef idx="0">
+            <a:schemeClr val="accent1"/>
+          </a:fillRef>
+          <a:effectRef idx="0">
+            <a:schemeClr val="accent1"/>
+          </a:effectRef>
+          <a:fontRef idx="minor">
+            <a:schemeClr val="tx1"/>
+          </a:fontRef>
+        </p:style>
+      </p:cxnSp>
+      <p:sp>
+        <p:nvSpPr>
+          <p:cNvPr id="24" name="Retângulo de cantos arredondados 23"/>
+          <p:cNvSpPr/>
+          <p:nvPr/>
+        </p:nvSpPr>
+        <p:spPr>
+          <a:xfrm>
+            <a:off x="608707" y="2329490"/>
+            <a:ext cx="851436" cy="849737"/>
+          </a:xfrm>
+          <a:prstGeom prst="roundRect">
+            <a:avLst/>
+          </a:prstGeom>
+          <a:noFill/>
+        </p:spPr>
+        <p:style>
+          <a:lnRef idx="2">
+            <a:schemeClr val="accent4">
+              <a:shade val="50000"/>
+            </a:schemeClr>
+          </a:lnRef>
+          <a:fillRef idx="1">
+            <a:schemeClr val="accent4"/>
+          </a:fillRef>
+          <a:effectRef idx="0">
+            <a:schemeClr val="accent4"/>
+          </a:effectRef>
+          <a:fontRef idx="minor">
+            <a:schemeClr val="lt1"/>
+          </a:fontRef>
+        </p:style>
+        <p:txBody>
+          <a:bodyPr rtlCol="0" anchor="ctr"/>
+          <a:lstStyle/>
+          <a:p>
+            <a:pPr algn="ctr"/>
+            <a:r>
+              <a:rPr lang="pt-PT" sz="1400" dirty="0" smtClean="0">
+                <a:ln w="0"/>
+                <a:solidFill>
+                  <a:schemeClr val="tx1"/>
+                </a:solidFill>
+                <a:effectLst>
+                  <a:outerShdw blurRad="38100" dist="19050" dir="2700000" algn="tl" rotWithShape="0">
+                    <a:schemeClr val="dk1">
+                      <a:alpha val="40000"/>
+                    </a:schemeClr>
+                  </a:outerShdw>
+                </a:effectLst>
+                <a:latin typeface="Consolas" panose="020B0609020204030204" pitchFamily="49" charset="0"/>
+                <a:cs typeface="Consolas" panose="020B0609020204030204" pitchFamily="49" charset="0"/>
+              </a:rPr>
+              <a:t>010110101010110</a:t>
+            </a:r>
+            <a:endParaRPr lang="pt-BR" sz="1400" dirty="0">
+              <a:ln w="0"/>
+              <a:solidFill>
+                <a:schemeClr val="tx1"/>
+              </a:solidFill>
+              <a:effectLst>
+                <a:outerShdw blurRad="38100" dist="19050" dir="2700000" algn="tl" rotWithShape="0">
+                  <a:schemeClr val="dk1">
+                    <a:alpha val="40000"/>
+                  </a:schemeClr>
+                </a:outerShdw>
+              </a:effectLst>
+              <a:latin typeface="Consolas" panose="020B0609020204030204" pitchFamily="49" charset="0"/>
+              <a:cs typeface="Consolas" panose="020B0609020204030204" pitchFamily="49" charset="0"/>
+            </a:endParaRPr>
+          </a:p>
+        </p:txBody>
+      </p:sp>
+      <p:sp>
+        <p:nvSpPr>
+          <p:cNvPr id="29" name="CaixaDeTexto 28"/>
+          <p:cNvSpPr txBox="1"/>
+          <p:nvPr/>
+        </p:nvSpPr>
+        <p:spPr>
+          <a:xfrm>
+            <a:off x="1549400" y="2772109"/>
+            <a:ext cx="1104900" cy="369332"/>
+          </a:xfrm>
+          <a:prstGeom prst="rect">
+            <a:avLst/>
+          </a:prstGeom>
+          <a:noFill/>
+        </p:spPr>
+        <p:txBody>
+          <a:bodyPr wrap="square" rtlCol="0">
+            <a:spAutoFit/>
+          </a:bodyPr>
+          <a:lstStyle/>
+          <a:p>
+            <a:pPr algn="ctr"/>
+            <a:r>
+              <a:rPr lang="pt-PT" dirty="0"/>
+              <a:t>Data</a:t>
+            </a:r>
+            <a:endParaRPr lang="pt-BR" dirty="0"/>
+          </a:p>
+        </p:txBody>
+      </p:sp>
+      <p:pic>
+        <p:nvPicPr>
+          <p:cNvPr id="1028" name="Picture 4" descr="https://encrypted-tbn2.gstatic.com/images?q=tbn:ANd9GcTbuG_HREhJ9FI0ZMC8KKMljMgX3ppf3hUWokoVLcxoG9pCz68V"/>
+          <p:cNvPicPr>
+            <a:picLocks noChangeAspect="1" noChangeArrowheads="1"/>
+          </p:cNvPicPr>
+          <p:nvPr/>
+        </p:nvPicPr>
+        <p:blipFill rotWithShape="1">
+          <a:blip r:embed="rId2">
+            <a:clrChange>
+              <a:clrFrom>
+                <a:srgbClr val="FFFFFF"/>
+              </a:clrFrom>
+              <a:clrTo>
+                <a:srgbClr val="FFFFFF">
+                  <a:alpha val="0"/>
+                </a:srgbClr>
+              </a:clrTo>
+            </a:clrChange>
+            <a:extLst>
+              <a:ext uri="{28A0092B-C50C-407E-A947-70E740481C1C}">
+                <a14:useLocalDpi xmlns:a14="http://schemas.microsoft.com/office/drawing/2010/main" val="0"/>
+              </a:ext>
+            </a:extLst>
+          </a:blip>
+          <a:srcRect l="33333" t="32034" r="32690" b="30852"/>
+          <a:stretch/>
+        </p:blipFill>
+        <p:spPr bwMode="auto">
+          <a:xfrm>
+            <a:off x="716302" y="1313643"/>
+            <a:ext cx="566221" cy="463272"/>
+          </a:xfrm>
+          <a:prstGeom prst="rect">
+            <a:avLst/>
+          </a:prstGeom>
+          <a:noFill/>
+          <a:extLst>
+            <a:ext uri="{909E8E84-426E-40DD-AFC4-6F175D3DCCD1}">
+              <a14:hiddenFill xmlns:a14="http://schemas.microsoft.com/office/drawing/2010/main">
+                <a:solidFill>
+                  <a:srgbClr val="FFFFFF"/>
+                </a:solidFill>
+              </a14:hiddenFill>
+            </a:ext>
+          </a:extLst>
+        </p:spPr>
+      </p:pic>
+      <p:pic>
+        <p:nvPicPr>
+          <p:cNvPr id="72" name="Picture 4" descr="https://encrypted-tbn2.gstatic.com/images?q=tbn:ANd9GcTbuG_HREhJ9FI0ZMC8KKMljMgX3ppf3hUWokoVLcxoG9pCz68V"/>
+          <p:cNvPicPr>
+            <a:picLocks noChangeAspect="1" noChangeArrowheads="1"/>
+          </p:cNvPicPr>
+          <p:nvPr/>
+        </p:nvPicPr>
+        <p:blipFill rotWithShape="1">
+          <a:blip r:embed="rId2">
+            <a:clrChange>
+              <a:clrFrom>
+                <a:srgbClr val="FFFFFF"/>
+              </a:clrFrom>
+              <a:clrTo>
+                <a:srgbClr val="FFFFFF">
+                  <a:alpha val="0"/>
+                </a:srgbClr>
+              </a:clrTo>
+            </a:clrChange>
+            <a:extLst>
+              <a:ext uri="{28A0092B-C50C-407E-A947-70E740481C1C}">
+                <a14:useLocalDpi xmlns:a14="http://schemas.microsoft.com/office/drawing/2010/main" val="0"/>
+              </a:ext>
+            </a:extLst>
+          </a:blip>
+          <a:srcRect l="33333" t="32034" r="32690" b="30852"/>
+          <a:stretch/>
+        </p:blipFill>
+        <p:spPr bwMode="auto">
+          <a:xfrm>
+            <a:off x="962881" y="1641935"/>
+            <a:ext cx="566221" cy="463272"/>
+          </a:xfrm>
+          <a:prstGeom prst="rect">
+            <a:avLst/>
+          </a:prstGeom>
+          <a:noFill/>
+          <a:extLst>
+            <a:ext uri="{909E8E84-426E-40DD-AFC4-6F175D3DCCD1}">
+              <a14:hiddenFill xmlns:a14="http://schemas.microsoft.com/office/drawing/2010/main">
+                <a:solidFill>
+                  <a:srgbClr val="FFFFFF"/>
+                </a:solidFill>
+              </a14:hiddenFill>
+            </a:ext>
+          </a:extLst>
+        </p:spPr>
+      </p:pic>
+      <p:sp>
+        <p:nvSpPr>
+          <p:cNvPr id="73" name="CaixaDeTexto 72"/>
+          <p:cNvSpPr txBox="1"/>
+          <p:nvPr/>
+        </p:nvSpPr>
+        <p:spPr>
+          <a:xfrm>
+            <a:off x="1574800" y="1872344"/>
+            <a:ext cx="1104900" cy="369332"/>
+          </a:xfrm>
+          <a:prstGeom prst="rect">
+            <a:avLst/>
+          </a:prstGeom>
+          <a:noFill/>
+        </p:spPr>
+        <p:txBody>
+          <a:bodyPr wrap="square" rtlCol="0">
+            <a:spAutoFit/>
+          </a:bodyPr>
+          <a:lstStyle/>
+          <a:p>
+            <a:pPr algn="ctr"/>
+            <a:r>
+              <a:rPr lang="pt-PT" dirty="0" smtClean="0"/>
+              <a:t>Audio</a:t>
+            </a:r>
+            <a:endParaRPr lang="pt-BR" dirty="0"/>
+          </a:p>
+        </p:txBody>
+      </p:sp>
+      <p:sp>
+        <p:nvSpPr>
+          <p:cNvPr id="74" name="CaixaDeTexto 73"/>
+          <p:cNvSpPr txBox="1"/>
+          <p:nvPr/>
+        </p:nvSpPr>
+        <p:spPr>
+          <a:xfrm>
+            <a:off x="1543096" y="821763"/>
+            <a:ext cx="1104900" cy="369332"/>
+          </a:xfrm>
+          <a:prstGeom prst="rect">
+            <a:avLst/>
+          </a:prstGeom>
+          <a:noFill/>
+        </p:spPr>
+        <p:txBody>
+          <a:bodyPr wrap="square" rtlCol="0">
+            <a:spAutoFit/>
+          </a:bodyPr>
+          <a:lstStyle/>
+          <a:p>
+            <a:pPr algn="ctr"/>
+            <a:r>
+              <a:rPr lang="pt-PT" dirty="0" smtClean="0"/>
+              <a:t>Video</a:t>
+            </a:r>
+            <a:endParaRPr lang="pt-BR" dirty="0"/>
+          </a:p>
+        </p:txBody>
+      </p:sp>
+      <p:sp>
+        <p:nvSpPr>
+          <p:cNvPr id="75" name="Retângulo de cantos arredondados 74"/>
+          <p:cNvSpPr/>
+          <p:nvPr/>
+        </p:nvSpPr>
+        <p:spPr>
+          <a:xfrm>
+            <a:off x="9519098" y="228022"/>
+            <a:ext cx="1790163" cy="577128"/>
+          </a:xfrm>
+          <a:prstGeom prst="roundRect">
+            <a:avLst/>
+          </a:prstGeom>
+        </p:spPr>
+        <p:style>
+          <a:lnRef idx="2">
+            <a:schemeClr val="accent6">
+              <a:shade val="50000"/>
+            </a:schemeClr>
+          </a:lnRef>
+          <a:fillRef idx="1">
+            <a:schemeClr val="accent6"/>
+          </a:fillRef>
+          <a:effectRef idx="0">
+            <a:schemeClr val="accent6"/>
+          </a:effectRef>
+          <a:fontRef idx="minor">
+            <a:schemeClr val="lt1"/>
+          </a:fontRef>
+        </p:style>
+        <p:txBody>
+          <a:bodyPr rtlCol="0" anchor="ctr"/>
+          <a:lstStyle/>
+          <a:p>
+            <a:pPr algn="ctr"/>
+            <a:r>
+              <a:rPr lang="pt-PT" dirty="0" smtClean="0"/>
+              <a:t>Error Correction Encoder</a:t>
+            </a:r>
+            <a:endParaRPr lang="pt-PT" dirty="0" smtClean="0"/>
+          </a:p>
+        </p:txBody>
+      </p:sp>
+      <p:sp>
+        <p:nvSpPr>
+          <p:cNvPr id="76" name="Retângulo de cantos arredondados 75"/>
+          <p:cNvSpPr/>
+          <p:nvPr/>
+        </p:nvSpPr>
+        <p:spPr>
+          <a:xfrm>
+            <a:off x="9519097" y="1176504"/>
+            <a:ext cx="1790163" cy="424868"/>
+          </a:xfrm>
+          <a:prstGeom prst="roundRect">
+            <a:avLst/>
+          </a:prstGeom>
+        </p:spPr>
+        <p:style>
+          <a:lnRef idx="2">
+            <a:schemeClr val="accent6">
+              <a:shade val="50000"/>
+            </a:schemeClr>
+          </a:lnRef>
+          <a:fillRef idx="1">
+            <a:schemeClr val="accent6"/>
+          </a:fillRef>
+          <a:effectRef idx="0">
+            <a:schemeClr val="accent6"/>
+          </a:effectRef>
+          <a:fontRef idx="minor">
+            <a:schemeClr val="lt1"/>
+          </a:fontRef>
+        </p:style>
+        <p:txBody>
+          <a:bodyPr rtlCol="0" anchor="ctr"/>
+          <a:lstStyle/>
+          <a:p>
+            <a:pPr algn="ctr"/>
+            <a:r>
+              <a:rPr lang="pt-PT" dirty="0" smtClean="0"/>
+              <a:t>Modulator</a:t>
+            </a:r>
+            <a:endParaRPr lang="pt-PT" dirty="0" smtClean="0"/>
+          </a:p>
+        </p:txBody>
+      </p:sp>
+      <p:cxnSp>
+        <p:nvCxnSpPr>
+          <p:cNvPr id="84" name="Conector angulado 83"/>
+          <p:cNvCxnSpPr>
+            <a:stCxn id="7" idx="3"/>
+            <a:endCxn id="8" idx="0"/>
+          </p:cNvCxnSpPr>
+          <p:nvPr/>
+        </p:nvCxnSpPr>
+        <p:spPr>
+          <a:xfrm>
+            <a:off x="4533543" y="748089"/>
+            <a:ext cx="2914561" cy="707414"/>
+          </a:xfrm>
+          <a:prstGeom prst="bentConnector2">
+            <a:avLst/>
+          </a:prstGeom>
+          <a:ln>
+            <a:tailEnd type="triangle"/>
+          </a:ln>
+        </p:spPr>
+        <p:style>
+          <a:lnRef idx="1">
+            <a:schemeClr val="accent1"/>
+          </a:lnRef>
+          <a:fillRef idx="0">
+            <a:schemeClr val="accent1"/>
+          </a:fillRef>
+          <a:effectRef idx="0">
+            <a:schemeClr val="accent1"/>
+          </a:effectRef>
+          <a:fontRef idx="minor">
+            <a:schemeClr val="tx1"/>
+          </a:fontRef>
+        </p:style>
+      </p:cxnSp>
+      <p:cxnSp>
+        <p:nvCxnSpPr>
+          <p:cNvPr id="90" name="Conector angulado 89"/>
+          <p:cNvCxnSpPr>
+            <a:stCxn id="24" idx="3"/>
+            <a:endCxn id="8" idx="2"/>
+          </p:cNvCxnSpPr>
+          <p:nvPr/>
+        </p:nvCxnSpPr>
+        <p:spPr>
+          <a:xfrm flipV="1">
+            <a:off x="1460143" y="2032630"/>
+            <a:ext cx="5987961" cy="721729"/>
+          </a:xfrm>
+          <a:prstGeom prst="bentConnector2">
+            <a:avLst/>
+          </a:prstGeom>
+          <a:ln>
+            <a:tailEnd type="triangle"/>
+          </a:ln>
+        </p:spPr>
+        <p:style>
+          <a:lnRef idx="1">
+            <a:schemeClr val="accent1"/>
+          </a:lnRef>
+          <a:fillRef idx="0">
+            <a:schemeClr val="accent1"/>
+          </a:fillRef>
+          <a:effectRef idx="0">
+            <a:schemeClr val="accent1"/>
+          </a:effectRef>
+          <a:fontRef idx="minor">
+            <a:schemeClr val="tx1"/>
+          </a:fontRef>
+        </p:style>
+      </p:cxnSp>
+      <p:cxnSp>
+        <p:nvCxnSpPr>
+          <p:cNvPr id="95" name="Conector angulado 94"/>
+          <p:cNvCxnSpPr>
+            <a:stCxn id="8" idx="3"/>
+            <a:endCxn id="75" idx="1"/>
+          </p:cNvCxnSpPr>
+          <p:nvPr/>
+        </p:nvCxnSpPr>
+        <p:spPr>
+          <a:xfrm flipV="1">
+            <a:off x="8343185" y="516586"/>
+            <a:ext cx="1175913" cy="1227481"/>
+          </a:xfrm>
+          <a:prstGeom prst="bentConnector3">
+            <a:avLst>
+              <a:gd name="adj1" fmla="val 78080"/>
+            </a:avLst>
+          </a:prstGeom>
+          <a:ln>
+            <a:tailEnd type="triangle"/>
+          </a:ln>
+        </p:spPr>
+        <p:style>
+          <a:lnRef idx="1">
+            <a:schemeClr val="accent1"/>
+          </a:lnRef>
+          <a:fillRef idx="0">
+            <a:schemeClr val="accent1"/>
+          </a:fillRef>
+          <a:effectRef idx="0">
+            <a:schemeClr val="accent1"/>
+          </a:effectRef>
+          <a:fontRef idx="minor">
+            <a:schemeClr val="tx1"/>
+          </a:fontRef>
+        </p:style>
+      </p:cxnSp>
+      <p:cxnSp>
+        <p:nvCxnSpPr>
+          <p:cNvPr id="97" name="Conector angulado 96"/>
+          <p:cNvCxnSpPr>
+            <a:stCxn id="75" idx="2"/>
+            <a:endCxn id="76" idx="0"/>
+          </p:cNvCxnSpPr>
+          <p:nvPr/>
+        </p:nvCxnSpPr>
+        <p:spPr>
+          <a:xfrm rot="5400000">
+            <a:off x="10228503" y="990827"/>
+            <a:ext cx="371354" cy="1"/>
+          </a:xfrm>
+          <a:prstGeom prst="bentConnector3">
+            <a:avLst>
+              <a:gd name="adj1" fmla="val 50000"/>
+            </a:avLst>
+          </a:prstGeom>
+          <a:ln>
+            <a:tailEnd type="triangle"/>
+          </a:ln>
+        </p:spPr>
+        <p:style>
+          <a:lnRef idx="1">
+            <a:schemeClr val="accent1"/>
+          </a:lnRef>
+          <a:fillRef idx="0">
+            <a:schemeClr val="accent1"/>
+          </a:fillRef>
+          <a:effectRef idx="0">
+            <a:schemeClr val="accent1"/>
+          </a:effectRef>
+          <a:fontRef idx="minor">
+            <a:schemeClr val="tx1"/>
+          </a:fontRef>
+        </p:style>
+      </p:cxnSp>
+      <p:cxnSp>
+        <p:nvCxnSpPr>
+          <p:cNvPr id="100" name="Conector angulado 99"/>
+          <p:cNvCxnSpPr>
+            <a:stCxn id="76" idx="2"/>
+            <a:endCxn id="16" idx="3"/>
+          </p:cNvCxnSpPr>
+          <p:nvPr/>
+        </p:nvCxnSpPr>
+        <p:spPr>
+          <a:xfrm rot="5400000">
+            <a:off x="10177348" y="1838203"/>
+            <a:ext cx="473663" cy="1"/>
+          </a:xfrm>
+          <a:prstGeom prst="bentConnector3">
+            <a:avLst>
+              <a:gd name="adj1" fmla="val 50000"/>
+            </a:avLst>
+          </a:prstGeom>
+          <a:ln>
+            <a:tailEnd type="triangle"/>
+          </a:ln>
+        </p:spPr>
+        <p:style>
+          <a:lnRef idx="1">
+            <a:schemeClr val="accent1"/>
+          </a:lnRef>
+          <a:fillRef idx="0">
+            <a:schemeClr val="accent1"/>
+          </a:fillRef>
+          <a:effectRef idx="0">
+            <a:schemeClr val="accent1"/>
+          </a:effectRef>
+          <a:fontRef idx="minor">
+            <a:schemeClr val="tx1"/>
+          </a:fontRef>
+        </p:style>
+      </p:cxnSp>
+      <p:sp>
+        <p:nvSpPr>
+          <p:cNvPr id="103" name="CaixaDeTexto 102"/>
+          <p:cNvSpPr txBox="1"/>
+          <p:nvPr/>
+        </p:nvSpPr>
+        <p:spPr>
+          <a:xfrm>
+            <a:off x="4392594" y="765488"/>
+            <a:ext cx="2420510" cy="307777"/>
+          </a:xfrm>
+          <a:prstGeom prst="rect">
+            <a:avLst/>
+          </a:prstGeom>
+          <a:noFill/>
+        </p:spPr>
+        <p:txBody>
+          <a:bodyPr wrap="square" rtlCol="0">
+            <a:spAutoFit/>
+          </a:bodyPr>
+          <a:lstStyle/>
+          <a:p>
+            <a:pPr algn="ctr"/>
+            <a:r>
+              <a:rPr lang="pt-PT" sz="1400" dirty="0" smtClean="0"/>
+              <a:t>Video Elementary Stream</a:t>
+            </a:r>
+            <a:endParaRPr lang="pt-BR" sz="1400" dirty="0"/>
+          </a:p>
+        </p:txBody>
+      </p:sp>
+      <p:cxnSp>
+        <p:nvCxnSpPr>
+          <p:cNvPr id="108" name="Conector de seta reta 107"/>
+          <p:cNvCxnSpPr>
+            <a:stCxn id="21" idx="3"/>
+            <a:endCxn id="8" idx="1"/>
+          </p:cNvCxnSpPr>
+          <p:nvPr/>
+        </p:nvCxnSpPr>
+        <p:spPr>
+          <a:xfrm>
+            <a:off x="4508143" y="1728862"/>
+            <a:ext cx="2044879" cy="15205"/>
+          </a:xfrm>
+          <a:prstGeom prst="straightConnector1">
+            <a:avLst/>
+          </a:prstGeom>
+          <a:ln>
+            <a:tailEnd type="triangle"/>
+          </a:ln>
+        </p:spPr>
+        <p:style>
+          <a:lnRef idx="1">
+            <a:schemeClr val="accent1"/>
+          </a:lnRef>
+          <a:fillRef idx="0">
+            <a:schemeClr val="accent1"/>
+          </a:fillRef>
+          <a:effectRef idx="0">
+            <a:schemeClr val="accent1"/>
+          </a:effectRef>
+          <a:fontRef idx="minor">
+            <a:schemeClr val="tx1"/>
+          </a:fontRef>
+        </p:style>
+      </p:cxnSp>
+      <p:sp>
+        <p:nvSpPr>
+          <p:cNvPr id="110" name="CaixaDeTexto 109"/>
+          <p:cNvSpPr txBox="1"/>
+          <p:nvPr/>
+        </p:nvSpPr>
+        <p:spPr>
+          <a:xfrm>
+            <a:off x="4306194" y="1717549"/>
+            <a:ext cx="2420510" cy="307777"/>
+          </a:xfrm>
+          <a:prstGeom prst="rect">
+            <a:avLst/>
+          </a:prstGeom>
+          <a:noFill/>
+        </p:spPr>
+        <p:txBody>
+          <a:bodyPr wrap="square" rtlCol="0">
+            <a:spAutoFit/>
+          </a:bodyPr>
+          <a:lstStyle/>
+          <a:p>
+            <a:pPr algn="ctr"/>
+            <a:r>
+              <a:rPr lang="pt-PT" sz="1400" dirty="0" smtClean="0"/>
+              <a:t>Audio Elementary Stream</a:t>
+            </a:r>
+            <a:endParaRPr lang="pt-BR" sz="1400" dirty="0"/>
+          </a:p>
+        </p:txBody>
+      </p:sp>
+      <p:sp>
+        <p:nvSpPr>
+          <p:cNvPr id="113" name="CaixaDeTexto 112"/>
+          <p:cNvSpPr txBox="1"/>
+          <p:nvPr/>
+        </p:nvSpPr>
+        <p:spPr>
+          <a:xfrm>
+            <a:off x="8299540" y="1749233"/>
+            <a:ext cx="1500029" cy="307777"/>
+          </a:xfrm>
+          <a:prstGeom prst="rect">
+            <a:avLst/>
+          </a:prstGeom>
+          <a:noFill/>
+        </p:spPr>
+        <p:txBody>
+          <a:bodyPr wrap="square" rtlCol="0">
+            <a:spAutoFit/>
+          </a:bodyPr>
+          <a:lstStyle/>
+          <a:p>
+            <a:pPr algn="ctr"/>
+            <a:r>
+              <a:rPr lang="pt-PT" sz="1400" dirty="0" smtClean="0"/>
+              <a:t>Transport Stream</a:t>
+            </a:r>
+            <a:endParaRPr lang="pt-BR" sz="1400" dirty="0"/>
+          </a:p>
+        </p:txBody>
+      </p:sp>
+    </p:spTree>
+    <p:extLst>
+      <p:ext uri="{BB962C8B-B14F-4D97-AF65-F5344CB8AC3E}">
+        <p14:creationId xmlns:p14="http://schemas.microsoft.com/office/powerpoint/2010/main" val="2564541181"/>
+      </p:ext>
+    </p:extLst>
+  </p:cSld>
+  <p:clrMapOvr>
+    <a:masterClrMapping/>
+  </p:clrMapOvr>
+</p:sld>
+</file>
+
 <file path=ppt/theme/theme1.xml><?xml version="1.0" encoding="utf-8"?>
 <a:theme xmlns:a="http://schemas.openxmlformats.org/drawingml/2006/main" name="Tema do Office">
   <a:themeElements>

</xml_diff>

<commit_message>
H264 encoder description added, TS introduction reviewed.
TODO:
- complete TS intro with NHK white paper;
- develop sync description;
- add mandatory tables and descriptors;
- describe audio encoder.
</commit_message>
<xml_diff>
--- a/relatorio/abntex2-modelos-1.9.2/figuras/diagramas.pptx
+++ b/relatorio/abntex2-modelos-1.9.2/figuras/diagramas.pptx
@@ -8,6 +8,7 @@
     <p:sldId id="256" r:id="rId2"/>
     <p:sldId id="257" r:id="rId3"/>
     <p:sldId id="258" r:id="rId4"/>
+    <p:sldId id="259" r:id="rId5"/>
   </p:sldIdLst>
   <p:sldSz cx="12192000" cy="6858000"/>
   <p:notesSz cx="6858000" cy="9144000"/>
@@ -245,7 +246,7 @@
           <a:p>
             <a:fld id="{7F981E3C-F023-4B2E-8C30-C087B244E656}" type="datetimeFigureOut">
               <a:rPr lang="pt-BR" smtClean="0"/>
-              <a:t>10/05/2014</a:t>
+              <a:t>18/05/2014</a:t>
             </a:fld>
             <a:endParaRPr lang="pt-BR"/>
           </a:p>
@@ -415,7 +416,7 @@
           <a:p>
             <a:fld id="{7F981E3C-F023-4B2E-8C30-C087B244E656}" type="datetimeFigureOut">
               <a:rPr lang="pt-BR" smtClean="0"/>
-              <a:t>10/05/2014</a:t>
+              <a:t>18/05/2014</a:t>
             </a:fld>
             <a:endParaRPr lang="pt-BR"/>
           </a:p>
@@ -595,7 +596,7 @@
           <a:p>
             <a:fld id="{7F981E3C-F023-4B2E-8C30-C087B244E656}" type="datetimeFigureOut">
               <a:rPr lang="pt-BR" smtClean="0"/>
-              <a:t>10/05/2014</a:t>
+              <a:t>18/05/2014</a:t>
             </a:fld>
             <a:endParaRPr lang="pt-BR"/>
           </a:p>
@@ -765,7 +766,7 @@
           <a:p>
             <a:fld id="{7F981E3C-F023-4B2E-8C30-C087B244E656}" type="datetimeFigureOut">
               <a:rPr lang="pt-BR" smtClean="0"/>
-              <a:t>10/05/2014</a:t>
+              <a:t>18/05/2014</a:t>
             </a:fld>
             <a:endParaRPr lang="pt-BR"/>
           </a:p>
@@ -1011,7 +1012,7 @@
           <a:p>
             <a:fld id="{7F981E3C-F023-4B2E-8C30-C087B244E656}" type="datetimeFigureOut">
               <a:rPr lang="pt-BR" smtClean="0"/>
-              <a:t>10/05/2014</a:t>
+              <a:t>18/05/2014</a:t>
             </a:fld>
             <a:endParaRPr lang="pt-BR"/>
           </a:p>
@@ -1243,7 +1244,7 @@
           <a:p>
             <a:fld id="{7F981E3C-F023-4B2E-8C30-C087B244E656}" type="datetimeFigureOut">
               <a:rPr lang="pt-BR" smtClean="0"/>
-              <a:t>10/05/2014</a:t>
+              <a:t>18/05/2014</a:t>
             </a:fld>
             <a:endParaRPr lang="pt-BR"/>
           </a:p>
@@ -1610,7 +1611,7 @@
           <a:p>
             <a:fld id="{7F981E3C-F023-4B2E-8C30-C087B244E656}" type="datetimeFigureOut">
               <a:rPr lang="pt-BR" smtClean="0"/>
-              <a:t>10/05/2014</a:t>
+              <a:t>18/05/2014</a:t>
             </a:fld>
             <a:endParaRPr lang="pt-BR"/>
           </a:p>
@@ -1728,7 +1729,7 @@
           <a:p>
             <a:fld id="{7F981E3C-F023-4B2E-8C30-C087B244E656}" type="datetimeFigureOut">
               <a:rPr lang="pt-BR" smtClean="0"/>
-              <a:t>10/05/2014</a:t>
+              <a:t>18/05/2014</a:t>
             </a:fld>
             <a:endParaRPr lang="pt-BR"/>
           </a:p>
@@ -1823,7 +1824,7 @@
           <a:p>
             <a:fld id="{7F981E3C-F023-4B2E-8C30-C087B244E656}" type="datetimeFigureOut">
               <a:rPr lang="pt-BR" smtClean="0"/>
-              <a:t>10/05/2014</a:t>
+              <a:t>18/05/2014</a:t>
             </a:fld>
             <a:endParaRPr lang="pt-BR"/>
           </a:p>
@@ -2100,7 +2101,7 @@
           <a:p>
             <a:fld id="{7F981E3C-F023-4B2E-8C30-C087B244E656}" type="datetimeFigureOut">
               <a:rPr lang="pt-BR" smtClean="0"/>
-              <a:t>10/05/2014</a:t>
+              <a:t>18/05/2014</a:t>
             </a:fld>
             <a:endParaRPr lang="pt-BR"/>
           </a:p>
@@ -2353,7 +2354,7 @@
           <a:p>
             <a:fld id="{7F981E3C-F023-4B2E-8C30-C087B244E656}" type="datetimeFigureOut">
               <a:rPr lang="pt-BR" smtClean="0"/>
-              <a:t>10/05/2014</a:t>
+              <a:t>18/05/2014</a:t>
             </a:fld>
             <a:endParaRPr lang="pt-BR"/>
           </a:p>
@@ -2566,7 +2567,7 @@
           <a:p>
             <a:fld id="{7F981E3C-F023-4B2E-8C30-C087B244E656}" type="datetimeFigureOut">
               <a:rPr lang="pt-BR" smtClean="0"/>
-              <a:t>10/05/2014</a:t>
+              <a:t>18/05/2014</a:t>
             </a:fld>
             <a:endParaRPr lang="pt-BR"/>
           </a:p>
@@ -5272,7 +5273,6 @@
               <a:rPr lang="pt-PT" dirty="0" smtClean="0"/>
               <a:t>Audio Encoder</a:t>
             </a:r>
-            <a:endParaRPr lang="pt-PT" dirty="0" smtClean="0"/>
           </a:p>
         </p:txBody>
       </p:sp>
@@ -5615,7 +5615,6 @@
               <a:rPr lang="pt-PT" dirty="0" smtClean="0"/>
               <a:t>Error Correction Encoder</a:t>
             </a:r>
-            <a:endParaRPr lang="pt-PT" dirty="0" smtClean="0"/>
           </a:p>
         </p:txBody>
       </p:sp>
@@ -5659,7 +5658,6 @@
               <a:rPr lang="pt-PT" dirty="0" smtClean="0"/>
               <a:t>Modulator</a:t>
             </a:r>
-            <a:endParaRPr lang="pt-PT" dirty="0" smtClean="0"/>
           </a:p>
         </p:txBody>
       </p:sp>
@@ -5982,6 +5980,1209 @@
     <p:extLst>
       <p:ext uri="{BB962C8B-B14F-4D97-AF65-F5344CB8AC3E}">
         <p14:creationId xmlns:p14="http://schemas.microsoft.com/office/powerpoint/2010/main" val="2564541181"/>
+      </p:ext>
+    </p:extLst>
+  </p:cSld>
+  <p:clrMapOvr>
+    <a:masterClrMapping/>
+  </p:clrMapOvr>
+</p:sld>
+</file>
+
+<file path=ppt/slides/slide4.xml><?xml version="1.0" encoding="utf-8"?>
+<p:sld xmlns:a="http://schemas.openxmlformats.org/drawingml/2006/main" xmlns:r="http://schemas.openxmlformats.org/officeDocument/2006/relationships" xmlns:p="http://schemas.openxmlformats.org/presentationml/2006/main">
+  <p:cSld>
+    <p:spTree>
+      <p:nvGrpSpPr>
+        <p:cNvPr id="1" name=""/>
+        <p:cNvGrpSpPr/>
+        <p:nvPr/>
+      </p:nvGrpSpPr>
+      <p:grpSpPr>
+        <a:xfrm>
+          <a:off x="0" y="0"/>
+          <a:ext cx="0" cy="0"/>
+          <a:chOff x="0" y="0"/>
+          <a:chExt cx="0" cy="0"/>
+        </a:xfrm>
+      </p:grpSpPr>
+      <p:sp>
+        <p:nvSpPr>
+          <p:cNvPr id="3" name="Subtítulo 2"/>
+          <p:cNvSpPr>
+            <a:spLocks noGrp="1"/>
+          </p:cNvSpPr>
+          <p:nvPr>
+            <p:ph type="subTitle" idx="1"/>
+          </p:nvPr>
+        </p:nvSpPr>
+        <p:spPr>
+          <a:xfrm>
+            <a:off x="1910367" y="6272011"/>
+            <a:ext cx="9144000" cy="444321"/>
+          </a:xfrm>
+        </p:spPr>
+        <p:txBody>
+          <a:bodyPr/>
+          <a:lstStyle/>
+          <a:p>
+            <a:r>
+              <a:rPr lang="pt-PT" dirty="0" smtClean="0"/>
+              <a:t>Sequencia de quadros IBBPBBP...</a:t>
+            </a:r>
+            <a:endParaRPr lang="pt-BR" dirty="0"/>
+          </a:p>
+        </p:txBody>
+      </p:sp>
+      <p:sp>
+        <p:nvSpPr>
+          <p:cNvPr id="5" name="Retângulo de cantos arredondados 4"/>
+          <p:cNvSpPr/>
+          <p:nvPr/>
+        </p:nvSpPr>
+        <p:spPr>
+          <a:xfrm>
+            <a:off x="1250886" y="857365"/>
+            <a:ext cx="1790163" cy="1684449"/>
+          </a:xfrm>
+          <a:prstGeom prst="roundRect">
+            <a:avLst/>
+          </a:prstGeom>
+        </p:spPr>
+        <p:style>
+          <a:lnRef idx="1">
+            <a:schemeClr val="accent4"/>
+          </a:lnRef>
+          <a:fillRef idx="2">
+            <a:schemeClr val="accent4"/>
+          </a:fillRef>
+          <a:effectRef idx="1">
+            <a:schemeClr val="accent4"/>
+          </a:effectRef>
+          <a:fontRef idx="minor">
+            <a:schemeClr val="dk1"/>
+          </a:fontRef>
+        </p:style>
+        <p:txBody>
+          <a:bodyPr rtlCol="0" anchor="ctr"/>
+          <a:lstStyle/>
+          <a:p>
+            <a:pPr algn="ctr"/>
+            <a:endParaRPr lang="pt-PT" dirty="0" smtClean="0">
+              <a:solidFill>
+                <a:prstClr val="white"/>
+              </a:solidFill>
+            </a:endParaRPr>
+          </a:p>
+          <a:p>
+            <a:pPr algn="ctr"/>
+            <a:endParaRPr lang="pt-PT" dirty="0">
+              <a:solidFill>
+                <a:prstClr val="white"/>
+              </a:solidFill>
+            </a:endParaRPr>
+          </a:p>
+          <a:p>
+            <a:pPr algn="ctr"/>
+            <a:endParaRPr lang="pt-PT" dirty="0" smtClean="0">
+              <a:solidFill>
+                <a:prstClr val="white"/>
+              </a:solidFill>
+            </a:endParaRPr>
+          </a:p>
+          <a:p>
+            <a:pPr algn="ctr"/>
+            <a:endParaRPr lang="pt-PT" dirty="0">
+              <a:solidFill>
+                <a:prstClr val="white"/>
+              </a:solidFill>
+            </a:endParaRPr>
+          </a:p>
+          <a:p>
+            <a:pPr algn="ctr"/>
+            <a:endParaRPr lang="pt-PT" dirty="0" smtClean="0">
+              <a:solidFill>
+                <a:prstClr val="white"/>
+              </a:solidFill>
+            </a:endParaRPr>
+          </a:p>
+          <a:p>
+            <a:r>
+              <a:rPr lang="pt-PT" dirty="0" smtClean="0">
+                <a:solidFill>
+                  <a:prstClr val="white"/>
+                </a:solidFill>
+              </a:rPr>
+              <a:t>I</a:t>
+            </a:r>
+            <a:endParaRPr lang="pt-BR" sz="1400" dirty="0">
+              <a:solidFill>
+                <a:prstClr val="white"/>
+              </a:solidFill>
+            </a:endParaRPr>
+          </a:p>
+        </p:txBody>
+      </p:sp>
+      <p:sp>
+        <p:nvSpPr>
+          <p:cNvPr id="27" name="Retângulo de cantos arredondados 26"/>
+          <p:cNvSpPr/>
+          <p:nvPr/>
+        </p:nvSpPr>
+        <p:spPr>
+          <a:xfrm>
+            <a:off x="3211647" y="857364"/>
+            <a:ext cx="1790163" cy="1684449"/>
+          </a:xfrm>
+          <a:prstGeom prst="roundRect">
+            <a:avLst/>
+          </a:prstGeom>
+        </p:spPr>
+        <p:style>
+          <a:lnRef idx="1">
+            <a:schemeClr val="accent6"/>
+          </a:lnRef>
+          <a:fillRef idx="2">
+            <a:schemeClr val="accent6"/>
+          </a:fillRef>
+          <a:effectRef idx="1">
+            <a:schemeClr val="accent6"/>
+          </a:effectRef>
+          <a:fontRef idx="minor">
+            <a:schemeClr val="dk1"/>
+          </a:fontRef>
+        </p:style>
+        <p:txBody>
+          <a:bodyPr rtlCol="0" anchor="ctr"/>
+          <a:lstStyle/>
+          <a:p>
+            <a:pPr algn="ctr"/>
+            <a:endParaRPr lang="pt-PT" dirty="0" smtClean="0">
+              <a:solidFill>
+                <a:prstClr val="white"/>
+              </a:solidFill>
+            </a:endParaRPr>
+          </a:p>
+          <a:p>
+            <a:pPr algn="ctr"/>
+            <a:endParaRPr lang="pt-PT" dirty="0">
+              <a:solidFill>
+                <a:prstClr val="white"/>
+              </a:solidFill>
+            </a:endParaRPr>
+          </a:p>
+          <a:p>
+            <a:pPr algn="ctr"/>
+            <a:endParaRPr lang="pt-PT" dirty="0" smtClean="0">
+              <a:solidFill>
+                <a:prstClr val="white"/>
+              </a:solidFill>
+            </a:endParaRPr>
+          </a:p>
+          <a:p>
+            <a:pPr algn="ctr"/>
+            <a:endParaRPr lang="pt-PT" dirty="0">
+              <a:solidFill>
+                <a:prstClr val="white"/>
+              </a:solidFill>
+            </a:endParaRPr>
+          </a:p>
+          <a:p>
+            <a:pPr algn="ctr"/>
+            <a:endParaRPr lang="pt-PT" dirty="0" smtClean="0">
+              <a:solidFill>
+                <a:prstClr val="white"/>
+              </a:solidFill>
+            </a:endParaRPr>
+          </a:p>
+          <a:p>
+            <a:r>
+              <a:rPr lang="pt-PT" dirty="0">
+                <a:solidFill>
+                  <a:prstClr val="white"/>
+                </a:solidFill>
+              </a:rPr>
+              <a:t>B</a:t>
+            </a:r>
+            <a:endParaRPr lang="pt-BR" sz="1400" dirty="0">
+              <a:solidFill>
+                <a:prstClr val="white"/>
+              </a:solidFill>
+            </a:endParaRPr>
+          </a:p>
+        </p:txBody>
+      </p:sp>
+      <p:sp>
+        <p:nvSpPr>
+          <p:cNvPr id="28" name="Retângulo de cantos arredondados 27"/>
+          <p:cNvSpPr/>
+          <p:nvPr/>
+        </p:nvSpPr>
+        <p:spPr>
+          <a:xfrm>
+            <a:off x="5197539" y="857364"/>
+            <a:ext cx="1790163" cy="1684449"/>
+          </a:xfrm>
+          <a:prstGeom prst="roundRect">
+            <a:avLst/>
+          </a:prstGeom>
+        </p:spPr>
+        <p:style>
+          <a:lnRef idx="1">
+            <a:schemeClr val="accent6"/>
+          </a:lnRef>
+          <a:fillRef idx="2">
+            <a:schemeClr val="accent6"/>
+          </a:fillRef>
+          <a:effectRef idx="1">
+            <a:schemeClr val="accent6"/>
+          </a:effectRef>
+          <a:fontRef idx="minor">
+            <a:schemeClr val="dk1"/>
+          </a:fontRef>
+        </p:style>
+        <p:txBody>
+          <a:bodyPr rtlCol="0" anchor="ctr"/>
+          <a:lstStyle/>
+          <a:p>
+            <a:pPr algn="ctr"/>
+            <a:endParaRPr lang="pt-PT" dirty="0" smtClean="0">
+              <a:solidFill>
+                <a:prstClr val="white"/>
+              </a:solidFill>
+            </a:endParaRPr>
+          </a:p>
+          <a:p>
+            <a:pPr algn="ctr"/>
+            <a:endParaRPr lang="pt-PT" dirty="0">
+              <a:solidFill>
+                <a:prstClr val="white"/>
+              </a:solidFill>
+            </a:endParaRPr>
+          </a:p>
+          <a:p>
+            <a:pPr algn="ctr"/>
+            <a:endParaRPr lang="pt-PT" dirty="0" smtClean="0">
+              <a:solidFill>
+                <a:prstClr val="white"/>
+              </a:solidFill>
+            </a:endParaRPr>
+          </a:p>
+          <a:p>
+            <a:pPr algn="ctr"/>
+            <a:endParaRPr lang="pt-PT" dirty="0">
+              <a:solidFill>
+                <a:prstClr val="white"/>
+              </a:solidFill>
+            </a:endParaRPr>
+          </a:p>
+          <a:p>
+            <a:pPr algn="ctr"/>
+            <a:endParaRPr lang="pt-PT" dirty="0" smtClean="0">
+              <a:solidFill>
+                <a:prstClr val="white"/>
+              </a:solidFill>
+            </a:endParaRPr>
+          </a:p>
+          <a:p>
+            <a:r>
+              <a:rPr lang="pt-PT" dirty="0">
+                <a:solidFill>
+                  <a:prstClr val="white"/>
+                </a:solidFill>
+              </a:rPr>
+              <a:t>B</a:t>
+            </a:r>
+            <a:endParaRPr lang="pt-BR" sz="1400" dirty="0">
+              <a:solidFill>
+                <a:prstClr val="white"/>
+              </a:solidFill>
+            </a:endParaRPr>
+          </a:p>
+        </p:txBody>
+      </p:sp>
+      <p:sp>
+        <p:nvSpPr>
+          <p:cNvPr id="29" name="Retângulo de cantos arredondados 28"/>
+          <p:cNvSpPr/>
+          <p:nvPr/>
+        </p:nvSpPr>
+        <p:spPr>
+          <a:xfrm>
+            <a:off x="7158300" y="857364"/>
+            <a:ext cx="1790163" cy="1684449"/>
+          </a:xfrm>
+          <a:prstGeom prst="roundRect">
+            <a:avLst/>
+          </a:prstGeom>
+        </p:spPr>
+        <p:style>
+          <a:lnRef idx="1">
+            <a:schemeClr val="accent1"/>
+          </a:lnRef>
+          <a:fillRef idx="3">
+            <a:schemeClr val="accent1"/>
+          </a:fillRef>
+          <a:effectRef idx="2">
+            <a:schemeClr val="accent1"/>
+          </a:effectRef>
+          <a:fontRef idx="minor">
+            <a:schemeClr val="lt1"/>
+          </a:fontRef>
+        </p:style>
+        <p:txBody>
+          <a:bodyPr rtlCol="0" anchor="ctr"/>
+          <a:lstStyle/>
+          <a:p>
+            <a:pPr algn="ctr"/>
+            <a:endParaRPr lang="pt-PT" dirty="0" smtClean="0">
+              <a:solidFill>
+                <a:prstClr val="white"/>
+              </a:solidFill>
+            </a:endParaRPr>
+          </a:p>
+          <a:p>
+            <a:pPr algn="ctr"/>
+            <a:endParaRPr lang="pt-PT" dirty="0">
+              <a:solidFill>
+                <a:prstClr val="white"/>
+              </a:solidFill>
+            </a:endParaRPr>
+          </a:p>
+          <a:p>
+            <a:pPr algn="ctr"/>
+            <a:endParaRPr lang="pt-PT" dirty="0" smtClean="0">
+              <a:solidFill>
+                <a:prstClr val="white"/>
+              </a:solidFill>
+            </a:endParaRPr>
+          </a:p>
+          <a:p>
+            <a:pPr algn="ctr"/>
+            <a:endParaRPr lang="pt-PT" dirty="0">
+              <a:solidFill>
+                <a:prstClr val="white"/>
+              </a:solidFill>
+            </a:endParaRPr>
+          </a:p>
+          <a:p>
+            <a:pPr algn="ctr"/>
+            <a:endParaRPr lang="pt-PT" dirty="0" smtClean="0">
+              <a:solidFill>
+                <a:prstClr val="white"/>
+              </a:solidFill>
+            </a:endParaRPr>
+          </a:p>
+          <a:p>
+            <a:r>
+              <a:rPr lang="pt-PT" dirty="0" smtClean="0">
+                <a:solidFill>
+                  <a:prstClr val="white"/>
+                </a:solidFill>
+              </a:rPr>
+              <a:t>P</a:t>
+            </a:r>
+            <a:endParaRPr lang="pt-BR" sz="1400" dirty="0">
+              <a:solidFill>
+                <a:prstClr val="white"/>
+              </a:solidFill>
+            </a:endParaRPr>
+          </a:p>
+        </p:txBody>
+      </p:sp>
+      <p:sp>
+        <p:nvSpPr>
+          <p:cNvPr id="30" name="Retângulo de cantos arredondados 29"/>
+          <p:cNvSpPr/>
+          <p:nvPr/>
+        </p:nvSpPr>
+        <p:spPr>
+          <a:xfrm>
+            <a:off x="9119061" y="857364"/>
+            <a:ext cx="1790163" cy="1684449"/>
+          </a:xfrm>
+          <a:prstGeom prst="roundRect">
+            <a:avLst/>
+          </a:prstGeom>
+        </p:spPr>
+        <p:style>
+          <a:lnRef idx="1">
+            <a:schemeClr val="accent6"/>
+          </a:lnRef>
+          <a:fillRef idx="2">
+            <a:schemeClr val="accent6"/>
+          </a:fillRef>
+          <a:effectRef idx="1">
+            <a:schemeClr val="accent6"/>
+          </a:effectRef>
+          <a:fontRef idx="minor">
+            <a:schemeClr val="dk1"/>
+          </a:fontRef>
+        </p:style>
+        <p:txBody>
+          <a:bodyPr rtlCol="0" anchor="ctr"/>
+          <a:lstStyle/>
+          <a:p>
+            <a:pPr algn="ctr"/>
+            <a:endParaRPr lang="pt-PT" dirty="0" smtClean="0">
+              <a:solidFill>
+                <a:prstClr val="white"/>
+              </a:solidFill>
+            </a:endParaRPr>
+          </a:p>
+          <a:p>
+            <a:pPr algn="ctr"/>
+            <a:endParaRPr lang="pt-PT" dirty="0">
+              <a:solidFill>
+                <a:prstClr val="white"/>
+              </a:solidFill>
+            </a:endParaRPr>
+          </a:p>
+          <a:p>
+            <a:pPr algn="ctr"/>
+            <a:endParaRPr lang="pt-PT" dirty="0" smtClean="0">
+              <a:solidFill>
+                <a:prstClr val="white"/>
+              </a:solidFill>
+            </a:endParaRPr>
+          </a:p>
+          <a:p>
+            <a:pPr algn="ctr"/>
+            <a:endParaRPr lang="pt-PT" dirty="0">
+              <a:solidFill>
+                <a:prstClr val="white"/>
+              </a:solidFill>
+            </a:endParaRPr>
+          </a:p>
+          <a:p>
+            <a:pPr algn="ctr"/>
+            <a:endParaRPr lang="pt-PT" dirty="0" smtClean="0">
+              <a:solidFill>
+                <a:prstClr val="white"/>
+              </a:solidFill>
+            </a:endParaRPr>
+          </a:p>
+          <a:p>
+            <a:r>
+              <a:rPr lang="pt-PT" dirty="0">
+                <a:solidFill>
+                  <a:prstClr val="white"/>
+                </a:solidFill>
+              </a:rPr>
+              <a:t>B</a:t>
+            </a:r>
+            <a:endParaRPr lang="pt-BR" sz="1400" dirty="0">
+              <a:solidFill>
+                <a:prstClr val="white"/>
+              </a:solidFill>
+            </a:endParaRPr>
+          </a:p>
+        </p:txBody>
+      </p:sp>
+      <p:sp>
+        <p:nvSpPr>
+          <p:cNvPr id="31" name="Retângulo de cantos arredondados 30"/>
+          <p:cNvSpPr/>
+          <p:nvPr/>
+        </p:nvSpPr>
+        <p:spPr>
+          <a:xfrm>
+            <a:off x="1250885" y="3347434"/>
+            <a:ext cx="1790163" cy="1684449"/>
+          </a:xfrm>
+          <a:prstGeom prst="roundRect">
+            <a:avLst/>
+          </a:prstGeom>
+        </p:spPr>
+        <p:style>
+          <a:lnRef idx="1">
+            <a:schemeClr val="accent6"/>
+          </a:lnRef>
+          <a:fillRef idx="2">
+            <a:schemeClr val="accent6"/>
+          </a:fillRef>
+          <a:effectRef idx="1">
+            <a:schemeClr val="accent6"/>
+          </a:effectRef>
+          <a:fontRef idx="minor">
+            <a:schemeClr val="dk1"/>
+          </a:fontRef>
+        </p:style>
+        <p:txBody>
+          <a:bodyPr rtlCol="0" anchor="ctr"/>
+          <a:lstStyle/>
+          <a:p>
+            <a:pPr algn="ctr"/>
+            <a:endParaRPr lang="pt-PT" dirty="0" smtClean="0">
+              <a:solidFill>
+                <a:prstClr val="white"/>
+              </a:solidFill>
+            </a:endParaRPr>
+          </a:p>
+          <a:p>
+            <a:pPr algn="ctr"/>
+            <a:endParaRPr lang="pt-PT" dirty="0">
+              <a:solidFill>
+                <a:prstClr val="white"/>
+              </a:solidFill>
+            </a:endParaRPr>
+          </a:p>
+          <a:p>
+            <a:pPr algn="ctr"/>
+            <a:endParaRPr lang="pt-PT" dirty="0" smtClean="0">
+              <a:solidFill>
+                <a:prstClr val="white"/>
+              </a:solidFill>
+            </a:endParaRPr>
+          </a:p>
+          <a:p>
+            <a:pPr algn="ctr"/>
+            <a:endParaRPr lang="pt-PT" dirty="0">
+              <a:solidFill>
+                <a:prstClr val="white"/>
+              </a:solidFill>
+            </a:endParaRPr>
+          </a:p>
+          <a:p>
+            <a:pPr algn="ctr"/>
+            <a:endParaRPr lang="pt-PT" dirty="0" smtClean="0">
+              <a:solidFill>
+                <a:prstClr val="white"/>
+              </a:solidFill>
+            </a:endParaRPr>
+          </a:p>
+          <a:p>
+            <a:r>
+              <a:rPr lang="pt-PT" dirty="0">
+                <a:solidFill>
+                  <a:prstClr val="white"/>
+                </a:solidFill>
+              </a:rPr>
+              <a:t>B</a:t>
+            </a:r>
+            <a:endParaRPr lang="pt-BR" sz="1400" dirty="0">
+              <a:solidFill>
+                <a:prstClr val="white"/>
+              </a:solidFill>
+            </a:endParaRPr>
+          </a:p>
+        </p:txBody>
+      </p:sp>
+      <p:sp>
+        <p:nvSpPr>
+          <p:cNvPr id="32" name="Retângulo de cantos arredondados 31"/>
+          <p:cNvSpPr/>
+          <p:nvPr/>
+        </p:nvSpPr>
+        <p:spPr>
+          <a:xfrm>
+            <a:off x="3228401" y="3347434"/>
+            <a:ext cx="1790163" cy="1684449"/>
+          </a:xfrm>
+          <a:prstGeom prst="roundRect">
+            <a:avLst/>
+          </a:prstGeom>
+        </p:spPr>
+        <p:style>
+          <a:lnRef idx="1">
+            <a:schemeClr val="accent1"/>
+          </a:lnRef>
+          <a:fillRef idx="3">
+            <a:schemeClr val="accent1"/>
+          </a:fillRef>
+          <a:effectRef idx="2">
+            <a:schemeClr val="accent1"/>
+          </a:effectRef>
+          <a:fontRef idx="minor">
+            <a:schemeClr val="lt1"/>
+          </a:fontRef>
+        </p:style>
+        <p:txBody>
+          <a:bodyPr rtlCol="0" anchor="ctr"/>
+          <a:lstStyle/>
+          <a:p>
+            <a:pPr algn="ctr"/>
+            <a:endParaRPr lang="pt-PT" dirty="0" smtClean="0">
+              <a:solidFill>
+                <a:prstClr val="white"/>
+              </a:solidFill>
+            </a:endParaRPr>
+          </a:p>
+          <a:p>
+            <a:pPr algn="ctr"/>
+            <a:endParaRPr lang="pt-PT" dirty="0">
+              <a:solidFill>
+                <a:prstClr val="white"/>
+              </a:solidFill>
+            </a:endParaRPr>
+          </a:p>
+          <a:p>
+            <a:pPr algn="ctr"/>
+            <a:endParaRPr lang="pt-PT" dirty="0" smtClean="0">
+              <a:solidFill>
+                <a:prstClr val="white"/>
+              </a:solidFill>
+            </a:endParaRPr>
+          </a:p>
+          <a:p>
+            <a:pPr algn="ctr"/>
+            <a:endParaRPr lang="pt-PT" dirty="0">
+              <a:solidFill>
+                <a:prstClr val="white"/>
+              </a:solidFill>
+            </a:endParaRPr>
+          </a:p>
+          <a:p>
+            <a:pPr algn="ctr"/>
+            <a:endParaRPr lang="pt-PT" dirty="0" smtClean="0">
+              <a:solidFill>
+                <a:prstClr val="white"/>
+              </a:solidFill>
+            </a:endParaRPr>
+          </a:p>
+          <a:p>
+            <a:r>
+              <a:rPr lang="pt-PT" dirty="0" smtClean="0">
+                <a:solidFill>
+                  <a:prstClr val="white"/>
+                </a:solidFill>
+              </a:rPr>
+              <a:t>P</a:t>
+            </a:r>
+            <a:endParaRPr lang="pt-BR" sz="1400" dirty="0">
+              <a:solidFill>
+                <a:prstClr val="white"/>
+              </a:solidFill>
+            </a:endParaRPr>
+          </a:p>
+        </p:txBody>
+      </p:sp>
+      <p:sp>
+        <p:nvSpPr>
+          <p:cNvPr id="33" name="Retângulo de cantos arredondados 32"/>
+          <p:cNvSpPr/>
+          <p:nvPr/>
+        </p:nvSpPr>
+        <p:spPr>
+          <a:xfrm>
+            <a:off x="5189162" y="3347434"/>
+            <a:ext cx="1790163" cy="1684449"/>
+          </a:xfrm>
+          <a:prstGeom prst="roundRect">
+            <a:avLst/>
+          </a:prstGeom>
+        </p:spPr>
+        <p:style>
+          <a:lnRef idx="1">
+            <a:schemeClr val="accent6"/>
+          </a:lnRef>
+          <a:fillRef idx="2">
+            <a:schemeClr val="accent6"/>
+          </a:fillRef>
+          <a:effectRef idx="1">
+            <a:schemeClr val="accent6"/>
+          </a:effectRef>
+          <a:fontRef idx="minor">
+            <a:schemeClr val="dk1"/>
+          </a:fontRef>
+        </p:style>
+        <p:txBody>
+          <a:bodyPr rtlCol="0" anchor="ctr"/>
+          <a:lstStyle/>
+          <a:p>
+            <a:pPr algn="ctr"/>
+            <a:endParaRPr lang="pt-PT" dirty="0" smtClean="0">
+              <a:solidFill>
+                <a:prstClr val="white"/>
+              </a:solidFill>
+            </a:endParaRPr>
+          </a:p>
+          <a:p>
+            <a:pPr algn="ctr"/>
+            <a:endParaRPr lang="pt-PT" dirty="0">
+              <a:solidFill>
+                <a:prstClr val="white"/>
+              </a:solidFill>
+            </a:endParaRPr>
+          </a:p>
+          <a:p>
+            <a:pPr algn="ctr"/>
+            <a:endParaRPr lang="pt-PT" dirty="0" smtClean="0">
+              <a:solidFill>
+                <a:prstClr val="white"/>
+              </a:solidFill>
+            </a:endParaRPr>
+          </a:p>
+          <a:p>
+            <a:pPr algn="ctr"/>
+            <a:endParaRPr lang="pt-PT" dirty="0">
+              <a:solidFill>
+                <a:prstClr val="white"/>
+              </a:solidFill>
+            </a:endParaRPr>
+          </a:p>
+          <a:p>
+            <a:pPr algn="ctr"/>
+            <a:endParaRPr lang="pt-PT" dirty="0" smtClean="0">
+              <a:solidFill>
+                <a:prstClr val="white"/>
+              </a:solidFill>
+            </a:endParaRPr>
+          </a:p>
+          <a:p>
+            <a:r>
+              <a:rPr lang="pt-PT" dirty="0">
+                <a:solidFill>
+                  <a:prstClr val="white"/>
+                </a:solidFill>
+              </a:rPr>
+              <a:t>B</a:t>
+            </a:r>
+            <a:endParaRPr lang="pt-BR" sz="1400" dirty="0">
+              <a:solidFill>
+                <a:prstClr val="white"/>
+              </a:solidFill>
+            </a:endParaRPr>
+          </a:p>
+        </p:txBody>
+      </p:sp>
+      <p:sp>
+        <p:nvSpPr>
+          <p:cNvPr id="34" name="Retângulo de cantos arredondados 33"/>
+          <p:cNvSpPr/>
+          <p:nvPr/>
+        </p:nvSpPr>
+        <p:spPr>
+          <a:xfrm>
+            <a:off x="7158300" y="3347434"/>
+            <a:ext cx="1790163" cy="1684449"/>
+          </a:xfrm>
+          <a:prstGeom prst="roundRect">
+            <a:avLst/>
+          </a:prstGeom>
+        </p:spPr>
+        <p:style>
+          <a:lnRef idx="1">
+            <a:schemeClr val="accent6"/>
+          </a:lnRef>
+          <a:fillRef idx="2">
+            <a:schemeClr val="accent6"/>
+          </a:fillRef>
+          <a:effectRef idx="1">
+            <a:schemeClr val="accent6"/>
+          </a:effectRef>
+          <a:fontRef idx="minor">
+            <a:schemeClr val="dk1"/>
+          </a:fontRef>
+        </p:style>
+        <p:txBody>
+          <a:bodyPr rtlCol="0" anchor="ctr"/>
+          <a:lstStyle/>
+          <a:p>
+            <a:pPr algn="ctr"/>
+            <a:endParaRPr lang="pt-PT" dirty="0" smtClean="0">
+              <a:solidFill>
+                <a:prstClr val="white"/>
+              </a:solidFill>
+            </a:endParaRPr>
+          </a:p>
+          <a:p>
+            <a:pPr algn="ctr"/>
+            <a:endParaRPr lang="pt-PT" dirty="0">
+              <a:solidFill>
+                <a:prstClr val="white"/>
+              </a:solidFill>
+            </a:endParaRPr>
+          </a:p>
+          <a:p>
+            <a:pPr algn="ctr"/>
+            <a:endParaRPr lang="pt-PT" dirty="0" smtClean="0">
+              <a:solidFill>
+                <a:prstClr val="white"/>
+              </a:solidFill>
+            </a:endParaRPr>
+          </a:p>
+          <a:p>
+            <a:pPr algn="ctr"/>
+            <a:endParaRPr lang="pt-PT" dirty="0">
+              <a:solidFill>
+                <a:prstClr val="white"/>
+              </a:solidFill>
+            </a:endParaRPr>
+          </a:p>
+          <a:p>
+            <a:pPr algn="ctr"/>
+            <a:endParaRPr lang="pt-PT" dirty="0" smtClean="0">
+              <a:solidFill>
+                <a:prstClr val="white"/>
+              </a:solidFill>
+            </a:endParaRPr>
+          </a:p>
+          <a:p>
+            <a:r>
+              <a:rPr lang="pt-PT" dirty="0">
+                <a:solidFill>
+                  <a:prstClr val="white"/>
+                </a:solidFill>
+              </a:rPr>
+              <a:t>B</a:t>
+            </a:r>
+            <a:endParaRPr lang="pt-BR" sz="1400" dirty="0">
+              <a:solidFill>
+                <a:prstClr val="white"/>
+              </a:solidFill>
+            </a:endParaRPr>
+          </a:p>
+        </p:txBody>
+      </p:sp>
+      <p:cxnSp>
+        <p:nvCxnSpPr>
+          <p:cNvPr id="8" name="Conector angulado 7"/>
+          <p:cNvCxnSpPr>
+            <a:stCxn id="5" idx="3"/>
+            <a:endCxn id="27" idx="1"/>
+          </p:cNvCxnSpPr>
+          <p:nvPr/>
+        </p:nvCxnSpPr>
+        <p:spPr>
+          <a:xfrm flipV="1">
+            <a:off x="3041049" y="1699589"/>
+            <a:ext cx="170598" cy="1"/>
+          </a:xfrm>
+          <a:prstGeom prst="bentConnector3">
+            <a:avLst/>
+          </a:prstGeom>
+          <a:ln>
+            <a:tailEnd type="triangle"/>
+          </a:ln>
+        </p:spPr>
+        <p:style>
+          <a:lnRef idx="1">
+            <a:schemeClr val="accent1"/>
+          </a:lnRef>
+          <a:fillRef idx="0">
+            <a:schemeClr val="accent1"/>
+          </a:fillRef>
+          <a:effectRef idx="0">
+            <a:schemeClr val="accent1"/>
+          </a:effectRef>
+          <a:fontRef idx="minor">
+            <a:schemeClr val="tx1"/>
+          </a:fontRef>
+        </p:style>
+      </p:cxnSp>
+      <p:cxnSp>
+        <p:nvCxnSpPr>
+          <p:cNvPr id="40" name="Conector angulado 39"/>
+          <p:cNvCxnSpPr/>
+          <p:nvPr/>
+        </p:nvCxnSpPr>
+        <p:spPr>
+          <a:xfrm flipV="1">
+            <a:off x="5001810" y="1699587"/>
+            <a:ext cx="170598" cy="1"/>
+          </a:xfrm>
+          <a:prstGeom prst="bentConnector3">
+            <a:avLst/>
+          </a:prstGeom>
+          <a:ln>
+            <a:tailEnd type="triangle"/>
+          </a:ln>
+        </p:spPr>
+        <p:style>
+          <a:lnRef idx="1">
+            <a:schemeClr val="accent1"/>
+          </a:lnRef>
+          <a:fillRef idx="0">
+            <a:schemeClr val="accent1"/>
+          </a:fillRef>
+          <a:effectRef idx="0">
+            <a:schemeClr val="accent1"/>
+          </a:effectRef>
+          <a:fontRef idx="minor">
+            <a:schemeClr val="tx1"/>
+          </a:fontRef>
+        </p:style>
+      </p:cxnSp>
+      <p:cxnSp>
+        <p:nvCxnSpPr>
+          <p:cNvPr id="45" name="Conector angulado 44"/>
+          <p:cNvCxnSpPr/>
+          <p:nvPr/>
+        </p:nvCxnSpPr>
+        <p:spPr>
+          <a:xfrm flipV="1">
+            <a:off x="6988494" y="1699586"/>
+            <a:ext cx="170598" cy="1"/>
+          </a:xfrm>
+          <a:prstGeom prst="bentConnector3">
+            <a:avLst/>
+          </a:prstGeom>
+          <a:ln>
+            <a:tailEnd type="triangle"/>
+          </a:ln>
+        </p:spPr>
+        <p:style>
+          <a:lnRef idx="1">
+            <a:schemeClr val="accent1"/>
+          </a:lnRef>
+          <a:fillRef idx="0">
+            <a:schemeClr val="accent1"/>
+          </a:fillRef>
+          <a:effectRef idx="0">
+            <a:schemeClr val="accent1"/>
+          </a:effectRef>
+          <a:fontRef idx="minor">
+            <a:schemeClr val="tx1"/>
+          </a:fontRef>
+        </p:style>
+      </p:cxnSp>
+      <p:cxnSp>
+        <p:nvCxnSpPr>
+          <p:cNvPr id="47" name="Conector angulado 46"/>
+          <p:cNvCxnSpPr/>
+          <p:nvPr/>
+        </p:nvCxnSpPr>
+        <p:spPr>
+          <a:xfrm flipV="1">
+            <a:off x="8947671" y="1692291"/>
+            <a:ext cx="170598" cy="1"/>
+          </a:xfrm>
+          <a:prstGeom prst="bentConnector3">
+            <a:avLst/>
+          </a:prstGeom>
+          <a:ln>
+            <a:tailEnd type="triangle"/>
+          </a:ln>
+        </p:spPr>
+        <p:style>
+          <a:lnRef idx="1">
+            <a:schemeClr val="accent1"/>
+          </a:lnRef>
+          <a:fillRef idx="0">
+            <a:schemeClr val="accent1"/>
+          </a:fillRef>
+          <a:effectRef idx="0">
+            <a:schemeClr val="accent1"/>
+          </a:effectRef>
+          <a:fontRef idx="minor">
+            <a:schemeClr val="tx1"/>
+          </a:fontRef>
+        </p:style>
+      </p:cxnSp>
+      <p:cxnSp>
+        <p:nvCxnSpPr>
+          <p:cNvPr id="48" name="Conector angulado 47"/>
+          <p:cNvCxnSpPr/>
+          <p:nvPr/>
+        </p:nvCxnSpPr>
+        <p:spPr>
+          <a:xfrm flipV="1">
+            <a:off x="6979325" y="4193794"/>
+            <a:ext cx="170598" cy="1"/>
+          </a:xfrm>
+          <a:prstGeom prst="bentConnector3">
+            <a:avLst/>
+          </a:prstGeom>
+          <a:ln>
+            <a:tailEnd type="triangle"/>
+          </a:ln>
+        </p:spPr>
+        <p:style>
+          <a:lnRef idx="1">
+            <a:schemeClr val="accent1"/>
+          </a:lnRef>
+          <a:fillRef idx="0">
+            <a:schemeClr val="accent1"/>
+          </a:fillRef>
+          <a:effectRef idx="0">
+            <a:schemeClr val="accent1"/>
+          </a:effectRef>
+          <a:fontRef idx="minor">
+            <a:schemeClr val="tx1"/>
+          </a:fontRef>
+        </p:style>
+      </p:cxnSp>
+      <p:cxnSp>
+        <p:nvCxnSpPr>
+          <p:cNvPr id="50" name="Conector angulado 49"/>
+          <p:cNvCxnSpPr/>
+          <p:nvPr/>
+        </p:nvCxnSpPr>
+        <p:spPr>
+          <a:xfrm flipV="1">
+            <a:off x="5018564" y="4189658"/>
+            <a:ext cx="170598" cy="1"/>
+          </a:xfrm>
+          <a:prstGeom prst="bentConnector3">
+            <a:avLst/>
+          </a:prstGeom>
+          <a:ln>
+            <a:tailEnd type="triangle"/>
+          </a:ln>
+        </p:spPr>
+        <p:style>
+          <a:lnRef idx="1">
+            <a:schemeClr val="accent1"/>
+          </a:lnRef>
+          <a:fillRef idx="0">
+            <a:schemeClr val="accent1"/>
+          </a:fillRef>
+          <a:effectRef idx="0">
+            <a:schemeClr val="accent1"/>
+          </a:effectRef>
+          <a:fontRef idx="minor">
+            <a:schemeClr val="tx1"/>
+          </a:fontRef>
+        </p:style>
+      </p:cxnSp>
+      <p:cxnSp>
+        <p:nvCxnSpPr>
+          <p:cNvPr id="51" name="Conector angulado 50"/>
+          <p:cNvCxnSpPr/>
+          <p:nvPr/>
+        </p:nvCxnSpPr>
+        <p:spPr>
+          <a:xfrm flipV="1">
+            <a:off x="3057803" y="4189658"/>
+            <a:ext cx="170598" cy="1"/>
+          </a:xfrm>
+          <a:prstGeom prst="bentConnector3">
+            <a:avLst/>
+          </a:prstGeom>
+          <a:ln>
+            <a:tailEnd type="triangle"/>
+          </a:ln>
+        </p:spPr>
+        <p:style>
+          <a:lnRef idx="1">
+            <a:schemeClr val="accent1"/>
+          </a:lnRef>
+          <a:fillRef idx="0">
+            <a:schemeClr val="accent1"/>
+          </a:fillRef>
+          <a:effectRef idx="0">
+            <a:schemeClr val="accent1"/>
+          </a:effectRef>
+          <a:fontRef idx="minor">
+            <a:schemeClr val="tx1"/>
+          </a:fontRef>
+        </p:style>
+      </p:cxnSp>
+      <p:cxnSp>
+        <p:nvCxnSpPr>
+          <p:cNvPr id="14" name="Conector angulado 13"/>
+          <p:cNvCxnSpPr>
+            <a:stCxn id="30" idx="3"/>
+            <a:endCxn id="31" idx="1"/>
+          </p:cNvCxnSpPr>
+          <p:nvPr/>
+        </p:nvCxnSpPr>
+        <p:spPr>
+          <a:xfrm flipH="1">
+            <a:off x="1250885" y="1699589"/>
+            <a:ext cx="9658339" cy="2490070"/>
+          </a:xfrm>
+          <a:prstGeom prst="bentConnector5">
+            <a:avLst>
+              <a:gd name="adj1" fmla="val -2367"/>
+              <a:gd name="adj2" fmla="val 50000"/>
+              <a:gd name="adj3" fmla="val 102367"/>
+            </a:avLst>
+          </a:prstGeom>
+          <a:ln>
+            <a:tailEnd type="triangle"/>
+          </a:ln>
+        </p:spPr>
+        <p:style>
+          <a:lnRef idx="1">
+            <a:schemeClr val="accent1"/>
+          </a:lnRef>
+          <a:fillRef idx="0">
+            <a:schemeClr val="accent1"/>
+          </a:fillRef>
+          <a:effectRef idx="0">
+            <a:schemeClr val="accent1"/>
+          </a:effectRef>
+          <a:fontRef idx="minor">
+            <a:schemeClr val="tx1"/>
+          </a:fontRef>
+        </p:style>
+      </p:cxnSp>
+      <p:sp>
+        <p:nvSpPr>
+          <p:cNvPr id="23" name="CaixaDeTexto 22"/>
+          <p:cNvSpPr txBox="1"/>
+          <p:nvPr/>
+        </p:nvSpPr>
+        <p:spPr>
+          <a:xfrm>
+            <a:off x="9499600" y="3835400"/>
+            <a:ext cx="774700" cy="584775"/>
+          </a:xfrm>
+          <a:prstGeom prst="rect">
+            <a:avLst/>
+          </a:prstGeom>
+          <a:noFill/>
+        </p:spPr>
+        <p:txBody>
+          <a:bodyPr wrap="square" rtlCol="0">
+            <a:spAutoFit/>
+          </a:bodyPr>
+          <a:lstStyle/>
+          <a:p>
+            <a:r>
+              <a:rPr lang="pt-PT" sz="3200" dirty="0" smtClean="0"/>
+              <a:t>. . .</a:t>
+            </a:r>
+            <a:endParaRPr lang="pt-BR" sz="3200" dirty="0"/>
+          </a:p>
+        </p:txBody>
+      </p:sp>
+      <p:cxnSp>
+        <p:nvCxnSpPr>
+          <p:cNvPr id="39" name="Conector angulado 38"/>
+          <p:cNvCxnSpPr>
+            <a:stCxn id="23" idx="3"/>
+            <a:endCxn id="5" idx="1"/>
+          </p:cNvCxnSpPr>
+          <p:nvPr/>
+        </p:nvCxnSpPr>
+        <p:spPr>
+          <a:xfrm flipH="1" flipV="1">
+            <a:off x="1250886" y="1699590"/>
+            <a:ext cx="9023414" cy="2428198"/>
+          </a:xfrm>
+          <a:prstGeom prst="bentConnector5">
+            <a:avLst>
+              <a:gd name="adj1" fmla="val -2533"/>
+              <a:gd name="adj2" fmla="val -48144"/>
+              <a:gd name="adj3" fmla="val 103659"/>
+            </a:avLst>
+          </a:prstGeom>
+          <a:ln>
+            <a:tailEnd type="triangle"/>
+          </a:ln>
+        </p:spPr>
+        <p:style>
+          <a:lnRef idx="1">
+            <a:schemeClr val="accent1"/>
+          </a:lnRef>
+          <a:fillRef idx="0">
+            <a:schemeClr val="accent1"/>
+          </a:fillRef>
+          <a:effectRef idx="0">
+            <a:schemeClr val="accent1"/>
+          </a:effectRef>
+          <a:fontRef idx="minor">
+            <a:schemeClr val="tx1"/>
+          </a:fontRef>
+        </p:style>
+      </p:cxnSp>
+    </p:spTree>
+    <p:extLst>
+      <p:ext uri="{BB962C8B-B14F-4D97-AF65-F5344CB8AC3E}">
+        <p14:creationId xmlns:p14="http://schemas.microsoft.com/office/powerpoint/2010/main" val="2264095420"/>
       </p:ext>
     </p:extLst>
   </p:cSld>

</xml_diff>

<commit_message>
Timing paragraph updated and PCR sampling block diagram added.
</commit_message>
<xml_diff>
--- a/relatorio/abntex2-modelos-1.9.2/figuras/diagramas.pptx
+++ b/relatorio/abntex2-modelos-1.9.2/figuras/diagramas.pptx
@@ -9,6 +9,7 @@
     <p:sldId id="257" r:id="rId3"/>
     <p:sldId id="258" r:id="rId4"/>
     <p:sldId id="259" r:id="rId5"/>
+    <p:sldId id="260" r:id="rId6"/>
   </p:sldIdLst>
   <p:sldSz cx="12192000" cy="6858000"/>
   <p:notesSz cx="6858000" cy="9144000"/>
@@ -109,7 +110,7 @@
   </p:defaultTextStyle>
   <p:extLst>
     <p:ext uri="{EFAFB233-063F-42B5-8137-9DF3F51BA10A}">
-      <p15:sldGuideLst xmlns:p15="http://schemas.microsoft.com/office/powerpoint/2012/main"/>
+      <p15:sldGuideLst xmlns:p15="http://schemas.microsoft.com/office/powerpoint/2012/main" xmlns=""/>
     </p:ext>
   </p:extLst>
 </p:presentation>
@@ -246,7 +247,8 @@
           <a:p>
             <a:fld id="{7F981E3C-F023-4B2E-8C30-C087B244E656}" type="datetimeFigureOut">
               <a:rPr lang="pt-BR" smtClean="0"/>
-              <a:t>18/05/2014</a:t>
+              <a:pPr/>
+              <a:t>22/5/2014</a:t>
             </a:fld>
             <a:endParaRPr lang="pt-BR"/>
           </a:p>
@@ -288,6 +290,7 @@
           <a:p>
             <a:fld id="{06B14292-DE05-4001-9038-9B82A33A6A71}" type="slidenum">
               <a:rPr lang="pt-BR" smtClean="0"/>
+              <a:pPr/>
               <a:t>‹nº›</a:t>
             </a:fld>
             <a:endParaRPr lang="pt-BR"/>
@@ -297,7 +300,7 @@
     </p:spTree>
     <p:extLst>
       <p:ext uri="{BB962C8B-B14F-4D97-AF65-F5344CB8AC3E}">
-        <p14:creationId xmlns:p14="http://schemas.microsoft.com/office/powerpoint/2010/main" val="3346162728"/>
+        <p14:creationId xmlns:p14="http://schemas.microsoft.com/office/powerpoint/2010/main" xmlns="" val="3346162728"/>
       </p:ext>
     </p:extLst>
   </p:cSld>
@@ -416,7 +419,8 @@
           <a:p>
             <a:fld id="{7F981E3C-F023-4B2E-8C30-C087B244E656}" type="datetimeFigureOut">
               <a:rPr lang="pt-BR" smtClean="0"/>
-              <a:t>18/05/2014</a:t>
+              <a:pPr/>
+              <a:t>22/5/2014</a:t>
             </a:fld>
             <a:endParaRPr lang="pt-BR"/>
           </a:p>
@@ -458,6 +462,7 @@
           <a:p>
             <a:fld id="{06B14292-DE05-4001-9038-9B82A33A6A71}" type="slidenum">
               <a:rPr lang="pt-BR" smtClean="0"/>
+              <a:pPr/>
               <a:t>‹nº›</a:t>
             </a:fld>
             <a:endParaRPr lang="pt-BR"/>
@@ -467,7 +472,7 @@
     </p:spTree>
     <p:extLst>
       <p:ext uri="{BB962C8B-B14F-4D97-AF65-F5344CB8AC3E}">
-        <p14:creationId xmlns:p14="http://schemas.microsoft.com/office/powerpoint/2010/main" val="3399439725"/>
+        <p14:creationId xmlns:p14="http://schemas.microsoft.com/office/powerpoint/2010/main" xmlns="" val="3399439725"/>
       </p:ext>
     </p:extLst>
   </p:cSld>
@@ -596,7 +601,8 @@
           <a:p>
             <a:fld id="{7F981E3C-F023-4B2E-8C30-C087B244E656}" type="datetimeFigureOut">
               <a:rPr lang="pt-BR" smtClean="0"/>
-              <a:t>18/05/2014</a:t>
+              <a:pPr/>
+              <a:t>22/5/2014</a:t>
             </a:fld>
             <a:endParaRPr lang="pt-BR"/>
           </a:p>
@@ -638,6 +644,7 @@
           <a:p>
             <a:fld id="{06B14292-DE05-4001-9038-9B82A33A6A71}" type="slidenum">
               <a:rPr lang="pt-BR" smtClean="0"/>
+              <a:pPr/>
               <a:t>‹nº›</a:t>
             </a:fld>
             <a:endParaRPr lang="pt-BR"/>
@@ -647,7 +654,7 @@
     </p:spTree>
     <p:extLst>
       <p:ext uri="{BB962C8B-B14F-4D97-AF65-F5344CB8AC3E}">
-        <p14:creationId xmlns:p14="http://schemas.microsoft.com/office/powerpoint/2010/main" val="2345909394"/>
+        <p14:creationId xmlns:p14="http://schemas.microsoft.com/office/powerpoint/2010/main" xmlns="" val="2345909394"/>
       </p:ext>
     </p:extLst>
   </p:cSld>
@@ -766,7 +773,8 @@
           <a:p>
             <a:fld id="{7F981E3C-F023-4B2E-8C30-C087B244E656}" type="datetimeFigureOut">
               <a:rPr lang="pt-BR" smtClean="0"/>
-              <a:t>18/05/2014</a:t>
+              <a:pPr/>
+              <a:t>22/5/2014</a:t>
             </a:fld>
             <a:endParaRPr lang="pt-BR"/>
           </a:p>
@@ -808,6 +816,7 @@
           <a:p>
             <a:fld id="{06B14292-DE05-4001-9038-9B82A33A6A71}" type="slidenum">
               <a:rPr lang="pt-BR" smtClean="0"/>
+              <a:pPr/>
               <a:t>‹nº›</a:t>
             </a:fld>
             <a:endParaRPr lang="pt-BR"/>
@@ -817,7 +826,7 @@
     </p:spTree>
     <p:extLst>
       <p:ext uri="{BB962C8B-B14F-4D97-AF65-F5344CB8AC3E}">
-        <p14:creationId xmlns:p14="http://schemas.microsoft.com/office/powerpoint/2010/main" val="3703175047"/>
+        <p14:creationId xmlns:p14="http://schemas.microsoft.com/office/powerpoint/2010/main" xmlns="" val="3703175047"/>
       </p:ext>
     </p:extLst>
   </p:cSld>
@@ -1012,7 +1021,8 @@
           <a:p>
             <a:fld id="{7F981E3C-F023-4B2E-8C30-C087B244E656}" type="datetimeFigureOut">
               <a:rPr lang="pt-BR" smtClean="0"/>
-              <a:t>18/05/2014</a:t>
+              <a:pPr/>
+              <a:t>22/5/2014</a:t>
             </a:fld>
             <a:endParaRPr lang="pt-BR"/>
           </a:p>
@@ -1054,6 +1064,7 @@
           <a:p>
             <a:fld id="{06B14292-DE05-4001-9038-9B82A33A6A71}" type="slidenum">
               <a:rPr lang="pt-BR" smtClean="0"/>
+              <a:pPr/>
               <a:t>‹nº›</a:t>
             </a:fld>
             <a:endParaRPr lang="pt-BR"/>
@@ -1063,7 +1074,7 @@
     </p:spTree>
     <p:extLst>
       <p:ext uri="{BB962C8B-B14F-4D97-AF65-F5344CB8AC3E}">
-        <p14:creationId xmlns:p14="http://schemas.microsoft.com/office/powerpoint/2010/main" val="1152049616"/>
+        <p14:creationId xmlns:p14="http://schemas.microsoft.com/office/powerpoint/2010/main" xmlns="" val="1152049616"/>
       </p:ext>
     </p:extLst>
   </p:cSld>
@@ -1244,7 +1255,8 @@
           <a:p>
             <a:fld id="{7F981E3C-F023-4B2E-8C30-C087B244E656}" type="datetimeFigureOut">
               <a:rPr lang="pt-BR" smtClean="0"/>
-              <a:t>18/05/2014</a:t>
+              <a:pPr/>
+              <a:t>22/5/2014</a:t>
             </a:fld>
             <a:endParaRPr lang="pt-BR"/>
           </a:p>
@@ -1286,6 +1298,7 @@
           <a:p>
             <a:fld id="{06B14292-DE05-4001-9038-9B82A33A6A71}" type="slidenum">
               <a:rPr lang="pt-BR" smtClean="0"/>
+              <a:pPr/>
               <a:t>‹nº›</a:t>
             </a:fld>
             <a:endParaRPr lang="pt-BR"/>
@@ -1295,7 +1308,7 @@
     </p:spTree>
     <p:extLst>
       <p:ext uri="{BB962C8B-B14F-4D97-AF65-F5344CB8AC3E}">
-        <p14:creationId xmlns:p14="http://schemas.microsoft.com/office/powerpoint/2010/main" val="3749148039"/>
+        <p14:creationId xmlns:p14="http://schemas.microsoft.com/office/powerpoint/2010/main" xmlns="" val="3749148039"/>
       </p:ext>
     </p:extLst>
   </p:cSld>
@@ -1611,7 +1624,8 @@
           <a:p>
             <a:fld id="{7F981E3C-F023-4B2E-8C30-C087B244E656}" type="datetimeFigureOut">
               <a:rPr lang="pt-BR" smtClean="0"/>
-              <a:t>18/05/2014</a:t>
+              <a:pPr/>
+              <a:t>22/5/2014</a:t>
             </a:fld>
             <a:endParaRPr lang="pt-BR"/>
           </a:p>
@@ -1653,6 +1667,7 @@
           <a:p>
             <a:fld id="{06B14292-DE05-4001-9038-9B82A33A6A71}" type="slidenum">
               <a:rPr lang="pt-BR" smtClean="0"/>
+              <a:pPr/>
               <a:t>‹nº›</a:t>
             </a:fld>
             <a:endParaRPr lang="pt-BR"/>
@@ -1662,7 +1677,7 @@
     </p:spTree>
     <p:extLst>
       <p:ext uri="{BB962C8B-B14F-4D97-AF65-F5344CB8AC3E}">
-        <p14:creationId xmlns:p14="http://schemas.microsoft.com/office/powerpoint/2010/main" val="2231941236"/>
+        <p14:creationId xmlns:p14="http://schemas.microsoft.com/office/powerpoint/2010/main" xmlns="" val="2231941236"/>
       </p:ext>
     </p:extLst>
   </p:cSld>
@@ -1729,7 +1744,8 @@
           <a:p>
             <a:fld id="{7F981E3C-F023-4B2E-8C30-C087B244E656}" type="datetimeFigureOut">
               <a:rPr lang="pt-BR" smtClean="0"/>
-              <a:t>18/05/2014</a:t>
+              <a:pPr/>
+              <a:t>22/5/2014</a:t>
             </a:fld>
             <a:endParaRPr lang="pt-BR"/>
           </a:p>
@@ -1771,6 +1787,7 @@
           <a:p>
             <a:fld id="{06B14292-DE05-4001-9038-9B82A33A6A71}" type="slidenum">
               <a:rPr lang="pt-BR" smtClean="0"/>
+              <a:pPr/>
               <a:t>‹nº›</a:t>
             </a:fld>
             <a:endParaRPr lang="pt-BR"/>
@@ -1780,7 +1797,7 @@
     </p:spTree>
     <p:extLst>
       <p:ext uri="{BB962C8B-B14F-4D97-AF65-F5344CB8AC3E}">
-        <p14:creationId xmlns:p14="http://schemas.microsoft.com/office/powerpoint/2010/main" val="2757764658"/>
+        <p14:creationId xmlns:p14="http://schemas.microsoft.com/office/powerpoint/2010/main" xmlns="" val="2757764658"/>
       </p:ext>
     </p:extLst>
   </p:cSld>
@@ -1824,7 +1841,8 @@
           <a:p>
             <a:fld id="{7F981E3C-F023-4B2E-8C30-C087B244E656}" type="datetimeFigureOut">
               <a:rPr lang="pt-BR" smtClean="0"/>
-              <a:t>18/05/2014</a:t>
+              <a:pPr/>
+              <a:t>22/5/2014</a:t>
             </a:fld>
             <a:endParaRPr lang="pt-BR"/>
           </a:p>
@@ -1866,6 +1884,7 @@
           <a:p>
             <a:fld id="{06B14292-DE05-4001-9038-9B82A33A6A71}" type="slidenum">
               <a:rPr lang="pt-BR" smtClean="0"/>
+              <a:pPr/>
               <a:t>‹nº›</a:t>
             </a:fld>
             <a:endParaRPr lang="pt-BR"/>
@@ -1875,7 +1894,7 @@
     </p:spTree>
     <p:extLst>
       <p:ext uri="{BB962C8B-B14F-4D97-AF65-F5344CB8AC3E}">
-        <p14:creationId xmlns:p14="http://schemas.microsoft.com/office/powerpoint/2010/main" val="3672854325"/>
+        <p14:creationId xmlns:p14="http://schemas.microsoft.com/office/powerpoint/2010/main" xmlns="" val="3672854325"/>
       </p:ext>
     </p:extLst>
   </p:cSld>
@@ -2101,7 +2120,8 @@
           <a:p>
             <a:fld id="{7F981E3C-F023-4B2E-8C30-C087B244E656}" type="datetimeFigureOut">
               <a:rPr lang="pt-BR" smtClean="0"/>
-              <a:t>18/05/2014</a:t>
+              <a:pPr/>
+              <a:t>22/5/2014</a:t>
             </a:fld>
             <a:endParaRPr lang="pt-BR"/>
           </a:p>
@@ -2143,6 +2163,7 @@
           <a:p>
             <a:fld id="{06B14292-DE05-4001-9038-9B82A33A6A71}" type="slidenum">
               <a:rPr lang="pt-BR" smtClean="0"/>
+              <a:pPr/>
               <a:t>‹nº›</a:t>
             </a:fld>
             <a:endParaRPr lang="pt-BR"/>
@@ -2152,7 +2173,7 @@
     </p:spTree>
     <p:extLst>
       <p:ext uri="{BB962C8B-B14F-4D97-AF65-F5344CB8AC3E}">
-        <p14:creationId xmlns:p14="http://schemas.microsoft.com/office/powerpoint/2010/main" val="1310300903"/>
+        <p14:creationId xmlns:p14="http://schemas.microsoft.com/office/powerpoint/2010/main" xmlns="" val="1310300903"/>
       </p:ext>
     </p:extLst>
   </p:cSld>
@@ -2354,7 +2375,8 @@
           <a:p>
             <a:fld id="{7F981E3C-F023-4B2E-8C30-C087B244E656}" type="datetimeFigureOut">
               <a:rPr lang="pt-BR" smtClean="0"/>
-              <a:t>18/05/2014</a:t>
+              <a:pPr/>
+              <a:t>22/5/2014</a:t>
             </a:fld>
             <a:endParaRPr lang="pt-BR"/>
           </a:p>
@@ -2396,6 +2418,7 @@
           <a:p>
             <a:fld id="{06B14292-DE05-4001-9038-9B82A33A6A71}" type="slidenum">
               <a:rPr lang="pt-BR" smtClean="0"/>
+              <a:pPr/>
               <a:t>‹nº›</a:t>
             </a:fld>
             <a:endParaRPr lang="pt-BR"/>
@@ -2405,7 +2428,7 @@
     </p:spTree>
     <p:extLst>
       <p:ext uri="{BB962C8B-B14F-4D97-AF65-F5344CB8AC3E}">
-        <p14:creationId xmlns:p14="http://schemas.microsoft.com/office/powerpoint/2010/main" val="331276270"/>
+        <p14:creationId xmlns:p14="http://schemas.microsoft.com/office/powerpoint/2010/main" xmlns="" val="331276270"/>
       </p:ext>
     </p:extLst>
   </p:cSld>
@@ -2567,7 +2590,8 @@
           <a:p>
             <a:fld id="{7F981E3C-F023-4B2E-8C30-C087B244E656}" type="datetimeFigureOut">
               <a:rPr lang="pt-BR" smtClean="0"/>
-              <a:t>18/05/2014</a:t>
+              <a:pPr/>
+              <a:t>22/5/2014</a:t>
             </a:fld>
             <a:endParaRPr lang="pt-BR"/>
           </a:p>
@@ -2645,6 +2669,7 @@
           <a:p>
             <a:fld id="{06B14292-DE05-4001-9038-9B82A33A6A71}" type="slidenum">
               <a:rPr lang="pt-BR" smtClean="0"/>
+              <a:pPr/>
               <a:t>‹nº›</a:t>
             </a:fld>
             <a:endParaRPr lang="pt-BR"/>
@@ -2654,7 +2679,7 @@
     </p:spTree>
     <p:extLst>
       <p:ext uri="{BB962C8B-B14F-4D97-AF65-F5344CB8AC3E}">
-        <p14:creationId xmlns:p14="http://schemas.microsoft.com/office/powerpoint/2010/main" val="2644906291"/>
+        <p14:creationId xmlns:p14="http://schemas.microsoft.com/office/powerpoint/2010/main" xmlns="" val="2644906291"/>
       </p:ext>
     </p:extLst>
   </p:cSld>
@@ -4098,7 +4123,7 @@
     </p:spTree>
     <p:extLst>
       <p:ext uri="{BB962C8B-B14F-4D97-AF65-F5344CB8AC3E}">
-        <p14:creationId xmlns:p14="http://schemas.microsoft.com/office/powerpoint/2010/main" val="1899401591"/>
+        <p14:creationId xmlns:p14="http://schemas.microsoft.com/office/powerpoint/2010/main" xmlns="" val="1899401591"/>
       </p:ext>
     </p:extLst>
   </p:cSld>
@@ -4855,7 +4880,7 @@
     </p:spTree>
     <p:extLst>
       <p:ext uri="{BB962C8B-B14F-4D97-AF65-F5344CB8AC3E}">
-        <p14:creationId xmlns:p14="http://schemas.microsoft.com/office/powerpoint/2010/main" val="32127210"/>
+        <p14:creationId xmlns:p14="http://schemas.microsoft.com/office/powerpoint/2010/main" xmlns="" val="32127210"/>
       </p:ext>
     </p:extLst>
   </p:cSld>
@@ -5424,7 +5449,7 @@
           <p:nvPr/>
         </p:nvPicPr>
         <p:blipFill rotWithShape="1">
-          <a:blip r:embed="rId2">
+          <a:blip r:embed="rId2" cstate="print">
             <a:clrChange>
               <a:clrFrom>
                 <a:srgbClr val="FFFFFF"/>
@@ -5437,7 +5462,7 @@
             </a:clrChange>
             <a:extLst>
               <a:ext uri="{28A0092B-C50C-407E-A947-70E740481C1C}">
-                <a14:useLocalDpi xmlns:a14="http://schemas.microsoft.com/office/drawing/2010/main" val="0"/>
+                <a14:useLocalDpi xmlns:a14="http://schemas.microsoft.com/office/drawing/2010/main" xmlns="" val="0"/>
               </a:ext>
             </a:extLst>
           </a:blip>
@@ -5455,7 +5480,7 @@
           <a:noFill/>
           <a:extLst>
             <a:ext uri="{909E8E84-426E-40DD-AFC4-6F175D3DCCD1}">
-              <a14:hiddenFill xmlns:a14="http://schemas.microsoft.com/office/drawing/2010/main">
+              <a14:hiddenFill xmlns:a14="http://schemas.microsoft.com/office/drawing/2010/main" xmlns="">
                 <a:solidFill>
                   <a:srgbClr val="FFFFFF"/>
                 </a:solidFill>
@@ -5473,7 +5498,7 @@
           <p:nvPr/>
         </p:nvPicPr>
         <p:blipFill rotWithShape="1">
-          <a:blip r:embed="rId2">
+          <a:blip r:embed="rId2" cstate="print">
             <a:clrChange>
               <a:clrFrom>
                 <a:srgbClr val="FFFFFF"/>
@@ -5486,7 +5511,7 @@
             </a:clrChange>
             <a:extLst>
               <a:ext uri="{28A0092B-C50C-407E-A947-70E740481C1C}">
-                <a14:useLocalDpi xmlns:a14="http://schemas.microsoft.com/office/drawing/2010/main" val="0"/>
+                <a14:useLocalDpi xmlns:a14="http://schemas.microsoft.com/office/drawing/2010/main" xmlns="" val="0"/>
               </a:ext>
             </a:extLst>
           </a:blip>
@@ -5504,7 +5529,7 @@
           <a:noFill/>
           <a:extLst>
             <a:ext uri="{909E8E84-426E-40DD-AFC4-6F175D3DCCD1}">
-              <a14:hiddenFill xmlns:a14="http://schemas.microsoft.com/office/drawing/2010/main">
+              <a14:hiddenFill xmlns:a14="http://schemas.microsoft.com/office/drawing/2010/main" xmlns="">
                 <a:solidFill>
                   <a:srgbClr val="FFFFFF"/>
                 </a:solidFill>
@@ -5979,7 +6004,7 @@
     </p:spTree>
     <p:extLst>
       <p:ext uri="{BB962C8B-B14F-4D97-AF65-F5344CB8AC3E}">
-        <p14:creationId xmlns:p14="http://schemas.microsoft.com/office/powerpoint/2010/main" val="2564541181"/>
+        <p14:creationId xmlns:p14="http://schemas.microsoft.com/office/powerpoint/2010/main" xmlns="" val="2564541181"/>
       </p:ext>
     </p:extLst>
   </p:cSld>
@@ -7182,7 +7207,1088 @@
     </p:spTree>
     <p:extLst>
       <p:ext uri="{BB962C8B-B14F-4D97-AF65-F5344CB8AC3E}">
-        <p14:creationId xmlns:p14="http://schemas.microsoft.com/office/powerpoint/2010/main" val="2264095420"/>
+        <p14:creationId xmlns:p14="http://schemas.microsoft.com/office/powerpoint/2010/main" xmlns="" val="2264095420"/>
+      </p:ext>
+    </p:extLst>
+  </p:cSld>
+  <p:clrMapOvr>
+    <a:masterClrMapping/>
+  </p:clrMapOvr>
+</p:sld>
+</file>
+
+<file path=ppt/slides/slide5.xml><?xml version="1.0" encoding="utf-8"?>
+<p:sld xmlns:a="http://schemas.openxmlformats.org/drawingml/2006/main" xmlns:r="http://schemas.openxmlformats.org/officeDocument/2006/relationships" xmlns:p="http://schemas.openxmlformats.org/presentationml/2006/main">
+  <p:cSld>
+    <p:spTree>
+      <p:nvGrpSpPr>
+        <p:cNvPr id="1" name=""/>
+        <p:cNvGrpSpPr/>
+        <p:nvPr/>
+      </p:nvGrpSpPr>
+      <p:grpSpPr>
+        <a:xfrm>
+          <a:off x="0" y="0"/>
+          <a:ext cx="0" cy="0"/>
+          <a:chOff x="0" y="0"/>
+          <a:chExt cx="0" cy="0"/>
+        </a:xfrm>
+      </p:grpSpPr>
+      <p:cxnSp>
+        <p:nvCxnSpPr>
+          <p:cNvPr id="35" name="Conector de seta reta 34"/>
+          <p:cNvCxnSpPr/>
+          <p:nvPr/>
+        </p:nvCxnSpPr>
+        <p:spPr>
+          <a:xfrm>
+            <a:off x="7526480" y="2989943"/>
+            <a:ext cx="0" cy="590013"/>
+          </a:xfrm>
+          <a:prstGeom prst="straightConnector1">
+            <a:avLst/>
+          </a:prstGeom>
+          <a:ln>
+            <a:tailEnd type="triangle"/>
+          </a:ln>
+        </p:spPr>
+        <p:style>
+          <a:lnRef idx="1">
+            <a:schemeClr val="accent1"/>
+          </a:lnRef>
+          <a:fillRef idx="0">
+            <a:schemeClr val="accent1"/>
+          </a:fillRef>
+          <a:effectRef idx="0">
+            <a:schemeClr val="accent1"/>
+          </a:effectRef>
+          <a:fontRef idx="minor">
+            <a:schemeClr val="tx1"/>
+          </a:fontRef>
+        </p:style>
+      </p:cxnSp>
+      <p:cxnSp>
+        <p:nvCxnSpPr>
+          <p:cNvPr id="37" name="Conector de seta reta 36"/>
+          <p:cNvCxnSpPr/>
+          <p:nvPr/>
+        </p:nvCxnSpPr>
+        <p:spPr>
+          <a:xfrm>
+            <a:off x="8455395" y="3178629"/>
+            <a:ext cx="0" cy="415841"/>
+          </a:xfrm>
+          <a:prstGeom prst="straightConnector1">
+            <a:avLst/>
+          </a:prstGeom>
+          <a:ln>
+            <a:tailEnd type="triangle"/>
+          </a:ln>
+        </p:spPr>
+        <p:style>
+          <a:lnRef idx="1">
+            <a:schemeClr val="accent1"/>
+          </a:lnRef>
+          <a:fillRef idx="0">
+            <a:schemeClr val="accent1"/>
+          </a:fillRef>
+          <a:effectRef idx="0">
+            <a:schemeClr val="accent1"/>
+          </a:effectRef>
+          <a:fontRef idx="minor">
+            <a:schemeClr val="tx1"/>
+          </a:fontRef>
+        </p:style>
+      </p:cxnSp>
+      <p:sp>
+        <p:nvSpPr>
+          <p:cNvPr id="4" name="Subtítulo 2"/>
+          <p:cNvSpPr txBox="1">
+            <a:spLocks/>
+          </p:cNvSpPr>
+          <p:nvPr/>
+        </p:nvSpPr>
+        <p:spPr>
+          <a:xfrm>
+            <a:off x="1910367" y="6272011"/>
+            <a:ext cx="9144000" cy="444321"/>
+          </a:xfrm>
+          <a:prstGeom prst="rect">
+            <a:avLst/>
+          </a:prstGeom>
+        </p:spPr>
+        <p:txBody>
+          <a:bodyPr vert="horz" lIns="91440" tIns="45720" rIns="91440" bIns="45720" rtlCol="0">
+            <a:normAutofit fontScale="92500" lnSpcReduction="10000"/>
+          </a:bodyPr>
+          <a:lstStyle>
+            <a:lvl1pPr marL="228600" indent="-228600" algn="l" defTabSz="914400" rtl="0" eaLnBrk="1" latinLnBrk="0" hangingPunct="1">
+              <a:lnSpc>
+                <a:spcPct val="90000"/>
+              </a:lnSpc>
+              <a:spcBef>
+                <a:spcPts val="1000"/>
+              </a:spcBef>
+              <a:buFont typeface="Arial" panose="020B0604020202020204" pitchFamily="34" charset="0"/>
+              <a:buChar char="•"/>
+              <a:defRPr sz="2800" kern="1200">
+                <a:solidFill>
+                  <a:schemeClr val="tx1"/>
+                </a:solidFill>
+                <a:latin typeface="+mn-lt"/>
+                <a:ea typeface="+mn-ea"/>
+                <a:cs typeface="+mn-cs"/>
+              </a:defRPr>
+            </a:lvl1pPr>
+            <a:lvl2pPr marL="685800" indent="-228600" algn="l" defTabSz="914400" rtl="0" eaLnBrk="1" latinLnBrk="0" hangingPunct="1">
+              <a:lnSpc>
+                <a:spcPct val="90000"/>
+              </a:lnSpc>
+              <a:spcBef>
+                <a:spcPts val="500"/>
+              </a:spcBef>
+              <a:buFont typeface="Arial" panose="020B0604020202020204" pitchFamily="34" charset="0"/>
+              <a:buChar char="•"/>
+              <a:defRPr sz="2400" kern="1200">
+                <a:solidFill>
+                  <a:schemeClr val="tx1"/>
+                </a:solidFill>
+                <a:latin typeface="+mn-lt"/>
+                <a:ea typeface="+mn-ea"/>
+                <a:cs typeface="+mn-cs"/>
+              </a:defRPr>
+            </a:lvl2pPr>
+            <a:lvl3pPr marL="1143000" indent="-228600" algn="l" defTabSz="914400" rtl="0" eaLnBrk="1" latinLnBrk="0" hangingPunct="1">
+              <a:lnSpc>
+                <a:spcPct val="90000"/>
+              </a:lnSpc>
+              <a:spcBef>
+                <a:spcPts val="500"/>
+              </a:spcBef>
+              <a:buFont typeface="Arial" panose="020B0604020202020204" pitchFamily="34" charset="0"/>
+              <a:buChar char="•"/>
+              <a:defRPr sz="2000" kern="1200">
+                <a:solidFill>
+                  <a:schemeClr val="tx1"/>
+                </a:solidFill>
+                <a:latin typeface="+mn-lt"/>
+                <a:ea typeface="+mn-ea"/>
+                <a:cs typeface="+mn-cs"/>
+              </a:defRPr>
+            </a:lvl3pPr>
+            <a:lvl4pPr marL="1600200" indent="-228600" algn="l" defTabSz="914400" rtl="0" eaLnBrk="1" latinLnBrk="0" hangingPunct="1">
+              <a:lnSpc>
+                <a:spcPct val="90000"/>
+              </a:lnSpc>
+              <a:spcBef>
+                <a:spcPts val="500"/>
+              </a:spcBef>
+              <a:buFont typeface="Arial" panose="020B0604020202020204" pitchFamily="34" charset="0"/>
+              <a:buChar char="•"/>
+              <a:defRPr sz="1800" kern="1200">
+                <a:solidFill>
+                  <a:schemeClr val="tx1"/>
+                </a:solidFill>
+                <a:latin typeface="+mn-lt"/>
+                <a:ea typeface="+mn-ea"/>
+                <a:cs typeface="+mn-cs"/>
+              </a:defRPr>
+            </a:lvl4pPr>
+            <a:lvl5pPr marL="2057400" indent="-228600" algn="l" defTabSz="914400" rtl="0" eaLnBrk="1" latinLnBrk="0" hangingPunct="1">
+              <a:lnSpc>
+                <a:spcPct val="90000"/>
+              </a:lnSpc>
+              <a:spcBef>
+                <a:spcPts val="500"/>
+              </a:spcBef>
+              <a:buFont typeface="Arial" panose="020B0604020202020204" pitchFamily="34" charset="0"/>
+              <a:buChar char="•"/>
+              <a:defRPr sz="1800" kern="1200">
+                <a:solidFill>
+                  <a:schemeClr val="tx1"/>
+                </a:solidFill>
+                <a:latin typeface="+mn-lt"/>
+                <a:ea typeface="+mn-ea"/>
+                <a:cs typeface="+mn-cs"/>
+              </a:defRPr>
+            </a:lvl5pPr>
+            <a:lvl6pPr marL="2514600" indent="-228600" algn="l" defTabSz="914400" rtl="0" eaLnBrk="1" latinLnBrk="0" hangingPunct="1">
+              <a:lnSpc>
+                <a:spcPct val="90000"/>
+              </a:lnSpc>
+              <a:spcBef>
+                <a:spcPts val="500"/>
+              </a:spcBef>
+              <a:buFont typeface="Arial" panose="020B0604020202020204" pitchFamily="34" charset="0"/>
+              <a:buChar char="•"/>
+              <a:defRPr sz="1800" kern="1200">
+                <a:solidFill>
+                  <a:schemeClr val="tx1"/>
+                </a:solidFill>
+                <a:latin typeface="+mn-lt"/>
+                <a:ea typeface="+mn-ea"/>
+                <a:cs typeface="+mn-cs"/>
+              </a:defRPr>
+            </a:lvl6pPr>
+            <a:lvl7pPr marL="2971800" indent="-228600" algn="l" defTabSz="914400" rtl="0" eaLnBrk="1" latinLnBrk="0" hangingPunct="1">
+              <a:lnSpc>
+                <a:spcPct val="90000"/>
+              </a:lnSpc>
+              <a:spcBef>
+                <a:spcPts val="500"/>
+              </a:spcBef>
+              <a:buFont typeface="Arial" panose="020B0604020202020204" pitchFamily="34" charset="0"/>
+              <a:buChar char="•"/>
+              <a:defRPr sz="1800" kern="1200">
+                <a:solidFill>
+                  <a:schemeClr val="tx1"/>
+                </a:solidFill>
+                <a:latin typeface="+mn-lt"/>
+                <a:ea typeface="+mn-ea"/>
+                <a:cs typeface="+mn-cs"/>
+              </a:defRPr>
+            </a:lvl7pPr>
+            <a:lvl8pPr marL="3429000" indent="-228600" algn="l" defTabSz="914400" rtl="0" eaLnBrk="1" latinLnBrk="0" hangingPunct="1">
+              <a:lnSpc>
+                <a:spcPct val="90000"/>
+              </a:lnSpc>
+              <a:spcBef>
+                <a:spcPts val="500"/>
+              </a:spcBef>
+              <a:buFont typeface="Arial" panose="020B0604020202020204" pitchFamily="34" charset="0"/>
+              <a:buChar char="•"/>
+              <a:defRPr sz="1800" kern="1200">
+                <a:solidFill>
+                  <a:schemeClr val="tx1"/>
+                </a:solidFill>
+                <a:latin typeface="+mn-lt"/>
+                <a:ea typeface="+mn-ea"/>
+                <a:cs typeface="+mn-cs"/>
+              </a:defRPr>
+            </a:lvl8pPr>
+            <a:lvl9pPr marL="3886200" indent="-228600" algn="l" defTabSz="914400" rtl="0" eaLnBrk="1" latinLnBrk="0" hangingPunct="1">
+              <a:lnSpc>
+                <a:spcPct val="90000"/>
+              </a:lnSpc>
+              <a:spcBef>
+                <a:spcPts val="500"/>
+              </a:spcBef>
+              <a:buFont typeface="Arial" panose="020B0604020202020204" pitchFamily="34" charset="0"/>
+              <a:buChar char="•"/>
+              <a:defRPr sz="1800" kern="1200">
+                <a:solidFill>
+                  <a:schemeClr val="tx1"/>
+                </a:solidFill>
+                <a:latin typeface="+mn-lt"/>
+                <a:ea typeface="+mn-ea"/>
+                <a:cs typeface="+mn-cs"/>
+              </a:defRPr>
+            </a:lvl9pPr>
+          </a:lstStyle>
+          <a:p>
+            <a:r>
+              <a:rPr lang="pt-PT" dirty="0" smtClean="0"/>
+              <a:t>Amostragem do PCR</a:t>
+            </a:r>
+            <a:endParaRPr lang="pt-BR" dirty="0"/>
+          </a:p>
+        </p:txBody>
+      </p:sp>
+      <p:sp>
+        <p:nvSpPr>
+          <p:cNvPr id="8" name="Retângulo de cantos arredondados 7"/>
+          <p:cNvSpPr/>
+          <p:nvPr/>
+        </p:nvSpPr>
+        <p:spPr>
+          <a:xfrm>
+            <a:off x="3264080" y="1284755"/>
+            <a:ext cx="1790163" cy="1017432"/>
+          </a:xfrm>
+          <a:prstGeom prst="roundRect">
+            <a:avLst/>
+          </a:prstGeom>
+        </p:spPr>
+        <p:style>
+          <a:lnRef idx="2">
+            <a:schemeClr val="accent6">
+              <a:shade val="50000"/>
+            </a:schemeClr>
+          </a:lnRef>
+          <a:fillRef idx="1">
+            <a:schemeClr val="accent6"/>
+          </a:fillRef>
+          <a:effectRef idx="0">
+            <a:schemeClr val="accent6"/>
+          </a:effectRef>
+          <a:fontRef idx="minor">
+            <a:schemeClr val="lt1"/>
+          </a:fontRef>
+        </p:style>
+        <p:txBody>
+          <a:bodyPr rtlCol="0" anchor="ctr"/>
+          <a:lstStyle/>
+          <a:p>
+            <a:pPr algn="ctr"/>
+            <a:r>
+              <a:rPr lang="pt-PT" dirty="0" smtClean="0">
+                <a:sym typeface="Symbol"/>
+              </a:rPr>
+              <a:t>300</a:t>
+            </a:r>
+            <a:endParaRPr lang="pt-PT" dirty="0" smtClean="0"/>
+          </a:p>
+        </p:txBody>
+      </p:sp>
+      <p:cxnSp>
+        <p:nvCxnSpPr>
+          <p:cNvPr id="11" name="Conector de seta reta 10"/>
+          <p:cNvCxnSpPr>
+            <a:endCxn id="8" idx="1"/>
+          </p:cNvCxnSpPr>
+          <p:nvPr/>
+        </p:nvCxnSpPr>
+        <p:spPr>
+          <a:xfrm>
+            <a:off x="2540000" y="1793471"/>
+            <a:ext cx="724080" cy="0"/>
+          </a:xfrm>
+          <a:prstGeom prst="straightConnector1">
+            <a:avLst/>
+          </a:prstGeom>
+          <a:ln>
+            <a:tailEnd type="triangle"/>
+          </a:ln>
+        </p:spPr>
+        <p:style>
+          <a:lnRef idx="1">
+            <a:schemeClr val="accent1"/>
+          </a:lnRef>
+          <a:fillRef idx="0">
+            <a:schemeClr val="accent1"/>
+          </a:fillRef>
+          <a:effectRef idx="0">
+            <a:schemeClr val="accent1"/>
+          </a:effectRef>
+          <a:fontRef idx="minor">
+            <a:schemeClr val="tx1"/>
+          </a:fontRef>
+        </p:style>
+      </p:cxnSp>
+      <p:cxnSp>
+        <p:nvCxnSpPr>
+          <p:cNvPr id="14" name="Conector de seta reta 13"/>
+          <p:cNvCxnSpPr>
+            <a:endCxn id="23" idx="1"/>
+          </p:cNvCxnSpPr>
+          <p:nvPr/>
+        </p:nvCxnSpPr>
+        <p:spPr>
+          <a:xfrm>
+            <a:off x="5054512" y="1793471"/>
+            <a:ext cx="691559" cy="11744"/>
+          </a:xfrm>
+          <a:prstGeom prst="straightConnector1">
+            <a:avLst/>
+          </a:prstGeom>
+          <a:ln>
+            <a:tailEnd type="triangle"/>
+          </a:ln>
+        </p:spPr>
+        <p:style>
+          <a:lnRef idx="1">
+            <a:schemeClr val="accent1"/>
+          </a:lnRef>
+          <a:fillRef idx="0">
+            <a:schemeClr val="accent1"/>
+          </a:fillRef>
+          <a:effectRef idx="0">
+            <a:schemeClr val="accent1"/>
+          </a:effectRef>
+          <a:fontRef idx="minor">
+            <a:schemeClr val="tx1"/>
+          </a:fontRef>
+        </p:style>
+      </p:cxnSp>
+      <p:sp>
+        <p:nvSpPr>
+          <p:cNvPr id="15" name="CaixaDeTexto 14"/>
+          <p:cNvSpPr txBox="1"/>
+          <p:nvPr/>
+        </p:nvSpPr>
+        <p:spPr>
+          <a:xfrm>
+            <a:off x="4992917" y="1866042"/>
+            <a:ext cx="812800" cy="369332"/>
+          </a:xfrm>
+          <a:prstGeom prst="rect">
+            <a:avLst/>
+          </a:prstGeom>
+          <a:noFill/>
+        </p:spPr>
+        <p:txBody>
+          <a:bodyPr wrap="square" rtlCol="0">
+            <a:spAutoFit/>
+          </a:bodyPr>
+          <a:lstStyle/>
+          <a:p>
+            <a:pPr algn="ctr"/>
+            <a:r>
+              <a:rPr lang="pt-PT" dirty="0" smtClean="0"/>
+              <a:t>90KHz</a:t>
+            </a:r>
+            <a:endParaRPr lang="pt-BR" dirty="0"/>
+          </a:p>
+        </p:txBody>
+      </p:sp>
+      <p:sp>
+        <p:nvSpPr>
+          <p:cNvPr id="19" name="Elipse 18"/>
+          <p:cNvSpPr/>
+          <p:nvPr/>
+        </p:nvSpPr>
+        <p:spPr>
+          <a:xfrm>
+            <a:off x="1785256" y="1480456"/>
+            <a:ext cx="653143" cy="653143"/>
+          </a:xfrm>
+          <a:prstGeom prst="ellipse">
+            <a:avLst/>
+          </a:prstGeom>
+        </p:spPr>
+        <p:style>
+          <a:lnRef idx="2">
+            <a:schemeClr val="accent1">
+              <a:shade val="50000"/>
+            </a:schemeClr>
+          </a:lnRef>
+          <a:fillRef idx="1">
+            <a:schemeClr val="accent1"/>
+          </a:fillRef>
+          <a:effectRef idx="0">
+            <a:schemeClr val="accent1"/>
+          </a:effectRef>
+          <a:fontRef idx="minor">
+            <a:schemeClr val="lt1"/>
+          </a:fontRef>
+        </p:style>
+        <p:txBody>
+          <a:bodyPr rtlCol="0" anchor="ctr"/>
+          <a:lstStyle/>
+          <a:p>
+            <a:pPr algn="ctr"/>
+            <a:r>
+              <a:rPr lang="pt-BR" sz="1100" dirty="0" smtClean="0"/>
+              <a:t> </a:t>
+            </a:r>
+            <a:endParaRPr lang="pt-BR" sz="4000" dirty="0" smtClean="0"/>
+          </a:p>
+          <a:p>
+            <a:pPr algn="ctr"/>
+            <a:r>
+              <a:rPr lang="pt-BR" sz="4000" dirty="0" smtClean="0"/>
+              <a:t>~</a:t>
+            </a:r>
+            <a:endParaRPr lang="pt-BR" dirty="0"/>
+          </a:p>
+        </p:txBody>
+      </p:sp>
+      <p:sp>
+        <p:nvSpPr>
+          <p:cNvPr id="20" name="CaixaDeTexto 19"/>
+          <p:cNvSpPr txBox="1"/>
+          <p:nvPr/>
+        </p:nvSpPr>
+        <p:spPr>
+          <a:xfrm>
+            <a:off x="362856" y="1488667"/>
+            <a:ext cx="1224643" cy="646331"/>
+          </a:xfrm>
+          <a:prstGeom prst="rect">
+            <a:avLst/>
+          </a:prstGeom>
+          <a:noFill/>
+        </p:spPr>
+        <p:txBody>
+          <a:bodyPr wrap="square" rtlCol="0">
+            <a:spAutoFit/>
+          </a:bodyPr>
+          <a:lstStyle/>
+          <a:p>
+            <a:pPr algn="ctr"/>
+            <a:r>
+              <a:rPr lang="pt-PT" dirty="0" smtClean="0"/>
+              <a:t>Reference</a:t>
+            </a:r>
+          </a:p>
+          <a:p>
+            <a:pPr algn="ctr"/>
+            <a:r>
+              <a:rPr lang="pt-PT" dirty="0" smtClean="0"/>
+              <a:t>Oscillator</a:t>
+            </a:r>
+            <a:endParaRPr lang="pt-BR" dirty="0"/>
+          </a:p>
+        </p:txBody>
+      </p:sp>
+      <p:sp>
+        <p:nvSpPr>
+          <p:cNvPr id="23" name="Retângulo de cantos arredondados 22"/>
+          <p:cNvSpPr/>
+          <p:nvPr/>
+        </p:nvSpPr>
+        <p:spPr>
+          <a:xfrm>
+            <a:off x="5746071" y="1524004"/>
+            <a:ext cx="3586619" cy="562422"/>
+          </a:xfrm>
+          <a:prstGeom prst="roundRect">
+            <a:avLst/>
+          </a:prstGeom>
+        </p:spPr>
+        <p:style>
+          <a:lnRef idx="2">
+            <a:schemeClr val="accent6">
+              <a:shade val="50000"/>
+            </a:schemeClr>
+          </a:lnRef>
+          <a:fillRef idx="1">
+            <a:schemeClr val="accent6"/>
+          </a:fillRef>
+          <a:effectRef idx="0">
+            <a:schemeClr val="accent6"/>
+          </a:effectRef>
+          <a:fontRef idx="minor">
+            <a:schemeClr val="lt1"/>
+          </a:fontRef>
+        </p:style>
+        <p:txBody>
+          <a:bodyPr rtlCol="0" anchor="ctr"/>
+          <a:lstStyle/>
+          <a:p>
+            <a:pPr algn="ctr"/>
+            <a:r>
+              <a:rPr lang="pt-PT" sz="2000" dirty="0" smtClean="0">
+                <a:sym typeface="Symbol"/>
+              </a:rPr>
+              <a:t>42 Bits Counter</a:t>
+            </a:r>
+            <a:endParaRPr lang="pt-PT" dirty="0" smtClean="0"/>
+          </a:p>
+        </p:txBody>
+      </p:sp>
+      <p:sp>
+        <p:nvSpPr>
+          <p:cNvPr id="24" name="CaixaDeTexto 23"/>
+          <p:cNvSpPr txBox="1"/>
+          <p:nvPr/>
+        </p:nvSpPr>
+        <p:spPr>
+          <a:xfrm>
+            <a:off x="2445657" y="1858785"/>
+            <a:ext cx="863599" cy="369332"/>
+          </a:xfrm>
+          <a:prstGeom prst="rect">
+            <a:avLst/>
+          </a:prstGeom>
+          <a:noFill/>
+        </p:spPr>
+        <p:txBody>
+          <a:bodyPr wrap="square" rtlCol="0">
+            <a:spAutoFit/>
+          </a:bodyPr>
+          <a:lstStyle/>
+          <a:p>
+            <a:pPr algn="ctr"/>
+            <a:r>
+              <a:rPr lang="pt-PT" dirty="0" smtClean="0"/>
+              <a:t>27M</a:t>
+            </a:r>
+            <a:r>
+              <a:rPr lang="pt-PT" dirty="0" smtClean="0"/>
+              <a:t>Hz</a:t>
+            </a:r>
+            <a:endParaRPr lang="pt-BR" dirty="0"/>
+          </a:p>
+        </p:txBody>
+      </p:sp>
+      <p:sp>
+        <p:nvSpPr>
+          <p:cNvPr id="25" name="Retângulo de cantos arredondados 24"/>
+          <p:cNvSpPr/>
+          <p:nvPr/>
+        </p:nvSpPr>
+        <p:spPr>
+          <a:xfrm>
+            <a:off x="6545948" y="3739619"/>
+            <a:ext cx="2032000" cy="1017432"/>
+          </a:xfrm>
+          <a:prstGeom prst="roundRect">
+            <a:avLst/>
+          </a:prstGeom>
+        </p:spPr>
+        <p:style>
+          <a:lnRef idx="2">
+            <a:schemeClr val="accent6">
+              <a:shade val="50000"/>
+            </a:schemeClr>
+          </a:lnRef>
+          <a:fillRef idx="1">
+            <a:schemeClr val="accent6"/>
+          </a:fillRef>
+          <a:effectRef idx="0">
+            <a:schemeClr val="accent6"/>
+          </a:effectRef>
+          <a:fontRef idx="minor">
+            <a:schemeClr val="lt1"/>
+          </a:fontRef>
+        </p:style>
+        <p:txBody>
+          <a:bodyPr rtlCol="0" anchor="ctr"/>
+          <a:lstStyle/>
+          <a:p>
+            <a:pPr algn="ctr"/>
+            <a:r>
+              <a:rPr lang="pt-PT" dirty="0" smtClean="0"/>
+              <a:t>MPEG2 Muxer</a:t>
+            </a:r>
+          </a:p>
+        </p:txBody>
+      </p:sp>
+      <p:cxnSp>
+        <p:nvCxnSpPr>
+          <p:cNvPr id="26" name="Conector de seta reta 25"/>
+          <p:cNvCxnSpPr/>
+          <p:nvPr/>
+        </p:nvCxnSpPr>
+        <p:spPr>
+          <a:xfrm>
+            <a:off x="5678630" y="4173809"/>
+            <a:ext cx="649602" cy="0"/>
+          </a:xfrm>
+          <a:prstGeom prst="straightConnector1">
+            <a:avLst/>
+          </a:prstGeom>
+          <a:ln>
+            <a:tailEnd type="triangle"/>
+          </a:ln>
+        </p:spPr>
+        <p:style>
+          <a:lnRef idx="1">
+            <a:schemeClr val="accent1"/>
+          </a:lnRef>
+          <a:fillRef idx="0">
+            <a:schemeClr val="accent1"/>
+          </a:fillRef>
+          <a:effectRef idx="0">
+            <a:schemeClr val="accent1"/>
+          </a:effectRef>
+          <a:fontRef idx="minor">
+            <a:schemeClr val="tx1"/>
+          </a:fontRef>
+        </p:style>
+      </p:cxnSp>
+      <p:cxnSp>
+        <p:nvCxnSpPr>
+          <p:cNvPr id="27" name="Conector de seta reta 26"/>
+          <p:cNvCxnSpPr/>
+          <p:nvPr/>
+        </p:nvCxnSpPr>
+        <p:spPr>
+          <a:xfrm>
+            <a:off x="5678630" y="4493124"/>
+            <a:ext cx="649602" cy="0"/>
+          </a:xfrm>
+          <a:prstGeom prst="straightConnector1">
+            <a:avLst/>
+          </a:prstGeom>
+          <a:ln>
+            <a:tailEnd type="triangle"/>
+          </a:ln>
+        </p:spPr>
+        <p:style>
+          <a:lnRef idx="1">
+            <a:schemeClr val="accent1"/>
+          </a:lnRef>
+          <a:fillRef idx="0">
+            <a:schemeClr val="accent1"/>
+          </a:fillRef>
+          <a:effectRef idx="0">
+            <a:schemeClr val="accent1"/>
+          </a:effectRef>
+          <a:fontRef idx="minor">
+            <a:schemeClr val="tx1"/>
+          </a:fontRef>
+        </p:style>
+      </p:cxnSp>
+      <p:cxnSp>
+        <p:nvCxnSpPr>
+          <p:cNvPr id="28" name="Conector de seta reta 27"/>
+          <p:cNvCxnSpPr/>
+          <p:nvPr/>
+        </p:nvCxnSpPr>
+        <p:spPr>
+          <a:xfrm>
+            <a:off x="6574977" y="2670622"/>
+            <a:ext cx="8075" cy="894819"/>
+          </a:xfrm>
+          <a:prstGeom prst="straightConnector1">
+            <a:avLst/>
+          </a:prstGeom>
+          <a:ln>
+            <a:tailEnd type="triangle"/>
+          </a:ln>
+        </p:spPr>
+        <p:style>
+          <a:lnRef idx="1">
+            <a:schemeClr val="accent1"/>
+          </a:lnRef>
+          <a:fillRef idx="0">
+            <a:schemeClr val="accent1"/>
+          </a:fillRef>
+          <a:effectRef idx="0">
+            <a:schemeClr val="accent1"/>
+          </a:effectRef>
+          <a:fontRef idx="minor">
+            <a:schemeClr val="tx1"/>
+          </a:fontRef>
+        </p:style>
+      </p:cxnSp>
+      <p:sp>
+        <p:nvSpPr>
+          <p:cNvPr id="32" name="Retângulo de cantos arredondados 31"/>
+          <p:cNvSpPr/>
+          <p:nvPr/>
+        </p:nvSpPr>
+        <p:spPr>
+          <a:xfrm>
+            <a:off x="6149897" y="2473382"/>
+            <a:ext cx="787935" cy="443989"/>
+          </a:xfrm>
+          <a:prstGeom prst="roundRect">
+            <a:avLst/>
+          </a:prstGeom>
+        </p:spPr>
+        <p:style>
+          <a:lnRef idx="2">
+            <a:schemeClr val="accent4">
+              <a:shade val="50000"/>
+            </a:schemeClr>
+          </a:lnRef>
+          <a:fillRef idx="1">
+            <a:schemeClr val="accent4"/>
+          </a:fillRef>
+          <a:effectRef idx="0">
+            <a:schemeClr val="accent4"/>
+          </a:effectRef>
+          <a:fontRef idx="minor">
+            <a:schemeClr val="lt1"/>
+          </a:fontRef>
+        </p:style>
+        <p:txBody>
+          <a:bodyPr rtlCol="0" anchor="ctr"/>
+          <a:lstStyle/>
+          <a:p>
+            <a:pPr algn="ctr"/>
+            <a:r>
+              <a:rPr lang="pt-BR" dirty="0" smtClean="0"/>
+              <a:t>PCR</a:t>
+            </a:r>
+            <a:endParaRPr lang="pt-BR" dirty="0"/>
+          </a:p>
+        </p:txBody>
+      </p:sp>
+      <p:sp>
+        <p:nvSpPr>
+          <p:cNvPr id="33" name="Retângulo de cantos arredondados 32"/>
+          <p:cNvSpPr/>
+          <p:nvPr/>
+        </p:nvSpPr>
+        <p:spPr>
+          <a:xfrm>
+            <a:off x="7107840" y="2850755"/>
+            <a:ext cx="787935" cy="443989"/>
+          </a:xfrm>
+          <a:prstGeom prst="roundRect">
+            <a:avLst/>
+          </a:prstGeom>
+        </p:spPr>
+        <p:style>
+          <a:lnRef idx="2">
+            <a:schemeClr val="accent4">
+              <a:shade val="50000"/>
+            </a:schemeClr>
+          </a:lnRef>
+          <a:fillRef idx="1">
+            <a:schemeClr val="accent4"/>
+          </a:fillRef>
+          <a:effectRef idx="0">
+            <a:schemeClr val="accent4"/>
+          </a:effectRef>
+          <a:fontRef idx="minor">
+            <a:schemeClr val="lt1"/>
+          </a:fontRef>
+        </p:style>
+        <p:txBody>
+          <a:bodyPr rtlCol="0" anchor="ctr"/>
+          <a:lstStyle/>
+          <a:p>
+            <a:pPr algn="ctr"/>
+            <a:r>
+              <a:rPr lang="pt-BR" dirty="0" smtClean="0"/>
+              <a:t>PCR</a:t>
+            </a:r>
+            <a:endParaRPr lang="pt-BR" dirty="0"/>
+          </a:p>
+        </p:txBody>
+      </p:sp>
+      <p:sp>
+        <p:nvSpPr>
+          <p:cNvPr id="34" name="Retângulo de cantos arredondados 33"/>
+          <p:cNvSpPr/>
+          <p:nvPr/>
+        </p:nvSpPr>
+        <p:spPr>
+          <a:xfrm>
+            <a:off x="8094812" y="3024924"/>
+            <a:ext cx="787935" cy="443989"/>
+          </a:xfrm>
+          <a:prstGeom prst="roundRect">
+            <a:avLst/>
+          </a:prstGeom>
+        </p:spPr>
+        <p:style>
+          <a:lnRef idx="2">
+            <a:schemeClr val="accent4">
+              <a:shade val="50000"/>
+            </a:schemeClr>
+          </a:lnRef>
+          <a:fillRef idx="1">
+            <a:schemeClr val="accent4"/>
+          </a:fillRef>
+          <a:effectRef idx="0">
+            <a:schemeClr val="accent4"/>
+          </a:effectRef>
+          <a:fontRef idx="minor">
+            <a:schemeClr val="lt1"/>
+          </a:fontRef>
+        </p:style>
+        <p:txBody>
+          <a:bodyPr rtlCol="0" anchor="ctr"/>
+          <a:lstStyle/>
+          <a:p>
+            <a:pPr algn="ctr"/>
+            <a:r>
+              <a:rPr lang="pt-BR" dirty="0" smtClean="0"/>
+              <a:t>PCR</a:t>
+            </a:r>
+            <a:endParaRPr lang="pt-BR" dirty="0"/>
+          </a:p>
+        </p:txBody>
+      </p:sp>
+      <p:cxnSp>
+        <p:nvCxnSpPr>
+          <p:cNvPr id="40" name="Conector de seta reta 39"/>
+          <p:cNvCxnSpPr/>
+          <p:nvPr/>
+        </p:nvCxnSpPr>
+        <p:spPr>
+          <a:xfrm>
+            <a:off x="6560461" y="2286956"/>
+            <a:ext cx="2380343" cy="0"/>
+          </a:xfrm>
+          <a:prstGeom prst="straightConnector1">
+            <a:avLst/>
+          </a:prstGeom>
+          <a:ln w="28575">
+            <a:tailEnd type="triangle"/>
+          </a:ln>
+        </p:spPr>
+        <p:style>
+          <a:lnRef idx="1">
+            <a:schemeClr val="dk1"/>
+          </a:lnRef>
+          <a:fillRef idx="0">
+            <a:schemeClr val="dk1"/>
+          </a:fillRef>
+          <a:effectRef idx="0">
+            <a:schemeClr val="dk1"/>
+          </a:effectRef>
+          <a:fontRef idx="minor">
+            <a:schemeClr val="tx1"/>
+          </a:fontRef>
+        </p:style>
+      </p:cxnSp>
+      <p:cxnSp>
+        <p:nvCxnSpPr>
+          <p:cNvPr id="44" name="Conector reto 43"/>
+          <p:cNvCxnSpPr/>
+          <p:nvPr/>
+        </p:nvCxnSpPr>
+        <p:spPr>
+          <a:xfrm>
+            <a:off x="6545947" y="2119085"/>
+            <a:ext cx="0" cy="333829"/>
+          </a:xfrm>
+          <a:prstGeom prst="line">
+            <a:avLst/>
+          </a:prstGeom>
+          <a:ln w="28575">
+            <a:headEnd type="none" w="med" len="med"/>
+            <a:tailEnd type="none" w="med" len="med"/>
+          </a:ln>
+        </p:spPr>
+        <p:style>
+          <a:lnRef idx="1">
+            <a:schemeClr val="dk1"/>
+          </a:lnRef>
+          <a:fillRef idx="0">
+            <a:schemeClr val="dk1"/>
+          </a:fillRef>
+          <a:effectRef idx="0">
+            <a:schemeClr val="dk1"/>
+          </a:effectRef>
+          <a:fontRef idx="minor">
+            <a:schemeClr val="tx1"/>
+          </a:fontRef>
+        </p:style>
+      </p:cxnSp>
+      <p:sp>
+        <p:nvSpPr>
+          <p:cNvPr id="45" name="CaixaDeTexto 44"/>
+          <p:cNvSpPr txBox="1"/>
+          <p:nvPr/>
+        </p:nvSpPr>
+        <p:spPr>
+          <a:xfrm>
+            <a:off x="8977087" y="2134546"/>
+            <a:ext cx="863599" cy="369332"/>
+          </a:xfrm>
+          <a:prstGeom prst="rect">
+            <a:avLst/>
+          </a:prstGeom>
+          <a:noFill/>
+        </p:spPr>
+        <p:txBody>
+          <a:bodyPr wrap="square" rtlCol="0">
+            <a:spAutoFit/>
+          </a:bodyPr>
+          <a:lstStyle/>
+          <a:p>
+            <a:pPr algn="ctr"/>
+            <a:r>
+              <a:rPr lang="pt-PT" dirty="0" smtClean="0"/>
+              <a:t>Time</a:t>
+            </a:r>
+            <a:endParaRPr lang="pt-BR" dirty="0"/>
+          </a:p>
+        </p:txBody>
+      </p:sp>
+      <p:cxnSp>
+        <p:nvCxnSpPr>
+          <p:cNvPr id="46" name="Conector reto 45"/>
+          <p:cNvCxnSpPr/>
+          <p:nvPr/>
+        </p:nvCxnSpPr>
+        <p:spPr>
+          <a:xfrm>
+            <a:off x="7532918" y="2119085"/>
+            <a:ext cx="0" cy="333829"/>
+          </a:xfrm>
+          <a:prstGeom prst="line">
+            <a:avLst/>
+          </a:prstGeom>
+          <a:ln w="28575">
+            <a:headEnd type="none" w="med" len="med"/>
+            <a:tailEnd type="none" w="med" len="med"/>
+          </a:ln>
+        </p:spPr>
+        <p:style>
+          <a:lnRef idx="1">
+            <a:schemeClr val="dk1"/>
+          </a:lnRef>
+          <a:fillRef idx="0">
+            <a:schemeClr val="dk1"/>
+          </a:fillRef>
+          <a:effectRef idx="0">
+            <a:schemeClr val="dk1"/>
+          </a:effectRef>
+          <a:fontRef idx="minor">
+            <a:schemeClr val="tx1"/>
+          </a:fontRef>
+        </p:style>
+      </p:cxnSp>
+      <p:cxnSp>
+        <p:nvCxnSpPr>
+          <p:cNvPr id="47" name="Conector reto 46"/>
+          <p:cNvCxnSpPr/>
+          <p:nvPr/>
+        </p:nvCxnSpPr>
+        <p:spPr>
+          <a:xfrm>
+            <a:off x="8534402" y="2119085"/>
+            <a:ext cx="0" cy="333829"/>
+          </a:xfrm>
+          <a:prstGeom prst="line">
+            <a:avLst/>
+          </a:prstGeom>
+          <a:ln w="28575">
+            <a:headEnd type="none" w="med" len="med"/>
+            <a:tailEnd type="none" w="med" len="med"/>
+          </a:ln>
+        </p:spPr>
+        <p:style>
+          <a:lnRef idx="1">
+            <a:schemeClr val="dk1"/>
+          </a:lnRef>
+          <a:fillRef idx="0">
+            <a:schemeClr val="dk1"/>
+          </a:fillRef>
+          <a:effectRef idx="0">
+            <a:schemeClr val="dk1"/>
+          </a:effectRef>
+          <a:fontRef idx="minor">
+            <a:schemeClr val="tx1"/>
+          </a:fontRef>
+        </p:style>
+      </p:cxnSp>
+      <p:cxnSp>
+        <p:nvCxnSpPr>
+          <p:cNvPr id="48" name="Conector de seta reta 47"/>
+          <p:cNvCxnSpPr/>
+          <p:nvPr/>
+        </p:nvCxnSpPr>
+        <p:spPr>
+          <a:xfrm>
+            <a:off x="8828230" y="4231867"/>
+            <a:ext cx="649602" cy="0"/>
+          </a:xfrm>
+          <a:prstGeom prst="straightConnector1">
+            <a:avLst/>
+          </a:prstGeom>
+          <a:ln>
+            <a:tailEnd type="triangle"/>
+          </a:ln>
+        </p:spPr>
+        <p:style>
+          <a:lnRef idx="1">
+            <a:schemeClr val="accent1"/>
+          </a:lnRef>
+          <a:fillRef idx="0">
+            <a:schemeClr val="accent1"/>
+          </a:fillRef>
+          <a:effectRef idx="0">
+            <a:schemeClr val="accent1"/>
+          </a:effectRef>
+          <a:fontRef idx="minor">
+            <a:schemeClr val="tx1"/>
+          </a:fontRef>
+        </p:style>
+      </p:cxnSp>
+    </p:spTree>
+    <p:extLst>
+      <p:ext uri="{BB962C8B-B14F-4D97-AF65-F5344CB8AC3E}">
+        <p14:creationId xmlns:p14="http://schemas.microsoft.com/office/powerpoint/2010/main" xmlns="" val="32127210"/>
       </p:ext>
     </p:extLst>
   </p:cSld>
@@ -7235,7 +8341,7 @@
     </a:clrScheme>
     <a:fontScheme name="Escritório">
       <a:majorFont>
-        <a:latin typeface="Calibri Light" panose="020F0302020204030204"/>
+        <a:latin typeface="Calibri Light"/>
         <a:ea typeface=""/>
         <a:cs typeface=""/>
         <a:font script="Jpan" typeface="ＭＳ Ｐゴシック"/>
@@ -7270,7 +8376,7 @@
         <a:font script="Geor" typeface="Sylfaen"/>
       </a:majorFont>
       <a:minorFont>
-        <a:latin typeface="Calibri" panose="020F0502020204030204"/>
+        <a:latin typeface="Calibri"/>
         <a:ea typeface=""/>
         <a:cs typeface=""/>
         <a:font script="Jpan" typeface="ＭＳ Ｐゴシック"/>
@@ -7447,7 +8553,7 @@
   <a:extraClrSchemeLst/>
   <a:extLst>
     <a:ext uri="{05A4C25C-085E-4340-85A3-A5531E510DB2}">
-      <thm15:themeFamily xmlns:thm15="http://schemas.microsoft.com/office/thememl/2012/main" name="Office Theme" id="{62F939B6-93AF-4DB8-9C6B-D6C7DFDC589F}" vid="{4A3C46E8-61CC-4603-A589-7422A47A8E4A}"/>
+      <thm15:themeFamily xmlns:thm15="http://schemas.microsoft.com/office/thememl/2012/main" xmlns="" name="Office Theme" id="{62F939B6-93AF-4DB8-9C6B-D6C7DFDC589F}" vid="{4A3C46E8-61CC-4603-A589-7422A47A8E4A}"/>
     </a:ext>
   </a:extLst>
 </a:theme>

</xml_diff>